<commit_message>
Minor changes to project 2 lectures
</commit_message>
<xml_diff>
--- a/Practicals/Project 2/Lecture/ppt/Project 2.pptx
+++ b/Practicals/Project 2/Lecture/ppt/Project 2.pptx
@@ -6,14 +6,13 @@
   </p:sldMasterIdLst>
   <p:sldIdLst>
     <p:sldId id="256" r:id="rId2"/>
-    <p:sldId id="257" r:id="rId3"/>
-    <p:sldId id="258" r:id="rId4"/>
-    <p:sldId id="262" r:id="rId5"/>
-    <p:sldId id="259" r:id="rId6"/>
-    <p:sldId id="260" r:id="rId7"/>
-    <p:sldId id="261" r:id="rId8"/>
-    <p:sldId id="263" r:id="rId9"/>
-    <p:sldId id="264" r:id="rId10"/>
+    <p:sldId id="258" r:id="rId3"/>
+    <p:sldId id="262" r:id="rId4"/>
+    <p:sldId id="259" r:id="rId5"/>
+    <p:sldId id="260" r:id="rId6"/>
+    <p:sldId id="261" r:id="rId7"/>
+    <p:sldId id="263" r:id="rId8"/>
+    <p:sldId id="264" r:id="rId9"/>
   </p:sldIdLst>
   <p:sldSz cx="12192000" cy="6858000"/>
   <p:notesSz cx="6858000" cy="9144000"/>
@@ -123,7 +122,7 @@
 <file path=ppt/revisionInfo.xml><?xml version="1.0" encoding="utf-8"?>
 <p1510:revInfo xmlns:a="http://schemas.openxmlformats.org/drawingml/2006/main" xmlns:r="http://schemas.openxmlformats.org/officeDocument/2006/relationships" xmlns:p1510="http://schemas.microsoft.com/office/powerpoint/2015/10/main">
   <p1510:revLst>
-    <p1510:client id="{C24F83EB-9709-4366-8028-22F07D7EF90B}" v="1852" dt="2021-03-27T18:29:04.440"/>
+    <p1510:client id="{C24F83EB-9709-4366-8028-22F07D7EF90B}" v="1866" dt="2021-03-28T08:17:46.163"/>
   </p1510:revLst>
 </p1510:revInfo>
 </file>
@@ -257,7 +256,7 @@
           <a:p>
             <a:fld id="{7EADE604-6095-4678-BC07-E2D82692C32E}" type="datetimeFigureOut">
               <a:rPr lang="en-US" smtClean="0"/>
-              <a:t>3/27/2021</a:t>
+              <a:t>3/28/2021</a:t>
             </a:fld>
             <a:endParaRPr lang="en-US"/>
           </a:p>
@@ -437,7 +436,7 @@
           <a:p>
             <a:fld id="{7EADE604-6095-4678-BC07-E2D82692C32E}" type="datetimeFigureOut">
               <a:rPr lang="en-US" smtClean="0"/>
-              <a:t>3/27/2021</a:t>
+              <a:t>3/28/2021</a:t>
             </a:fld>
             <a:endParaRPr lang="en-US"/>
           </a:p>
@@ -627,7 +626,7 @@
           <a:p>
             <a:fld id="{7EADE604-6095-4678-BC07-E2D82692C32E}" type="datetimeFigureOut">
               <a:rPr lang="en-US" smtClean="0"/>
-              <a:t>3/27/2021</a:t>
+              <a:t>3/28/2021</a:t>
             </a:fld>
             <a:endParaRPr lang="en-US"/>
           </a:p>
@@ -807,7 +806,7 @@
           <a:p>
             <a:fld id="{7EADE604-6095-4678-BC07-E2D82692C32E}" type="datetimeFigureOut">
               <a:rPr lang="en-US" smtClean="0"/>
-              <a:t>3/27/2021</a:t>
+              <a:t>3/28/2021</a:t>
             </a:fld>
             <a:endParaRPr lang="en-US"/>
           </a:p>
@@ -1064,7 +1063,7 @@
           <a:p>
             <a:fld id="{7EADE604-6095-4678-BC07-E2D82692C32E}" type="datetimeFigureOut">
               <a:rPr lang="en-US" smtClean="0"/>
-              <a:t>3/27/2021</a:t>
+              <a:t>3/28/2021</a:t>
             </a:fld>
             <a:endParaRPr lang="en-US"/>
           </a:p>
@@ -1305,7 +1304,7 @@
           <a:p>
             <a:fld id="{7EADE604-6095-4678-BC07-E2D82692C32E}" type="datetimeFigureOut">
               <a:rPr lang="en-US" smtClean="0"/>
-              <a:t>3/27/2021</a:t>
+              <a:t>3/28/2021</a:t>
             </a:fld>
             <a:endParaRPr lang="en-US"/>
           </a:p>
@@ -1681,7 +1680,7 @@
           <a:p>
             <a:fld id="{7EADE604-6095-4678-BC07-E2D82692C32E}" type="datetimeFigureOut">
               <a:rPr lang="en-US" smtClean="0"/>
-              <a:t>3/27/2021</a:t>
+              <a:t>3/28/2021</a:t>
             </a:fld>
             <a:endParaRPr lang="en-US"/>
           </a:p>
@@ -1810,7 +1809,7 @@
           <a:p>
             <a:fld id="{7EADE604-6095-4678-BC07-E2D82692C32E}" type="datetimeFigureOut">
               <a:rPr lang="en-US" smtClean="0"/>
-              <a:t>3/27/2021</a:t>
+              <a:t>3/28/2021</a:t>
             </a:fld>
             <a:endParaRPr lang="en-US"/>
           </a:p>
@@ -1917,7 +1916,7 @@
           <a:p>
             <a:fld id="{7EADE604-6095-4678-BC07-E2D82692C32E}" type="datetimeFigureOut">
               <a:rPr lang="en-US" smtClean="0"/>
-              <a:t>3/27/2021</a:t>
+              <a:t>3/28/2021</a:t>
             </a:fld>
             <a:endParaRPr lang="en-US"/>
           </a:p>
@@ -2204,7 +2203,7 @@
           <a:p>
             <a:fld id="{7EADE604-6095-4678-BC07-E2D82692C32E}" type="datetimeFigureOut">
               <a:rPr lang="en-US" smtClean="0"/>
-              <a:t>3/27/2021</a:t>
+              <a:t>3/28/2021</a:t>
             </a:fld>
             <a:endParaRPr lang="en-US"/>
           </a:p>
@@ -2468,7 +2467,7 @@
           <a:p>
             <a:fld id="{7EADE604-6095-4678-BC07-E2D82692C32E}" type="datetimeFigureOut">
               <a:rPr lang="en-US" smtClean="0"/>
-              <a:t>3/27/2021</a:t>
+              <a:t>3/28/2021</a:t>
             </a:fld>
             <a:endParaRPr lang="en-US"/>
           </a:p>
@@ -2691,7 +2690,7 @@
           <a:p>
             <a:fld id="{7EADE604-6095-4678-BC07-E2D82692C32E}" type="datetimeFigureOut">
               <a:rPr lang="en-US" smtClean="0"/>
-              <a:t>3/27/2021</a:t>
+              <a:t>3/28/2021</a:t>
             </a:fld>
             <a:endParaRPr lang="en-US"/>
           </a:p>
@@ -3328,7 +3327,12 @@
             <p:ph type="title"/>
           </p:nvPr>
         </p:nvSpPr>
-        <p:spPr/>
+        <p:spPr>
+          <a:xfrm>
+            <a:off x="838200" y="1401647"/>
+            <a:ext cx="10515600" cy="879865"/>
+          </a:xfrm>
+        </p:spPr>
         <p:txBody>
           <a:bodyPr/>
           <a:lstStyle/>
@@ -3338,7 +3342,7 @@
               <a:rPr lang="en-US" b="1" dirty="0">
                 <a:cs typeface="Calibri Light"/>
               </a:rPr>
-              <a:t>Aim of the Project</a:t>
+              <a:t>Components involved</a:t>
             </a:r>
           </a:p>
         </p:txBody>
@@ -3353,7 +3357,12 @@
             <p:ph idx="1"/>
           </p:nvPr>
         </p:nvSpPr>
-        <p:spPr/>
+        <p:spPr>
+          <a:xfrm>
+            <a:off x="838200" y="2295829"/>
+            <a:ext cx="10515600" cy="3881133"/>
+          </a:xfrm>
+        </p:spPr>
         <p:txBody>
           <a:bodyPr vert="horz" lIns="91440" tIns="45720" rIns="91440" bIns="45720" rtlCol="0" anchor="t">
             <a:normAutofit/>
@@ -3364,7 +3373,7 @@
               <a:rPr lang="en-US" dirty="0">
                 <a:cs typeface="Calibri"/>
               </a:rPr>
-              <a:t>The aim of this project is to design and implement a wireless lighting system that will be used at homes, offices and industries.</a:t>
+              <a:t>Arduino UNO R3 Board</a:t>
             </a:r>
           </a:p>
           <a:p>
@@ -3372,7 +3381,7 @@
               <a:rPr lang="en-US" dirty="0">
                 <a:cs typeface="Calibri"/>
               </a:rPr>
-              <a:t>It is a remote controlled AC bulb.</a:t>
+              <a:t>Relay</a:t>
             </a:r>
           </a:p>
           <a:p>
@@ -3380,7 +3389,39 @@
               <a:rPr lang="en-US" dirty="0">
                 <a:cs typeface="Calibri"/>
               </a:rPr>
-              <a:t>The project can be used by people with disabilities, people who are not able to step on a wall switch and those who have low access to switches at a distance.</a:t>
+              <a:t>AC Bulb</a:t>
+            </a:r>
+          </a:p>
+          <a:p>
+            <a:r>
+              <a:rPr lang="en-US" dirty="0">
+                <a:cs typeface="Calibri"/>
+              </a:rPr>
+              <a:t>IR Receiver sensor</a:t>
+            </a:r>
+          </a:p>
+          <a:p>
+            <a:r>
+              <a:rPr lang="en-US" dirty="0">
+                <a:cs typeface="Calibri"/>
+              </a:rPr>
+              <a:t>Jumpers and connecting wires</a:t>
+            </a:r>
+          </a:p>
+          <a:p>
+            <a:r>
+              <a:rPr lang="en-US" dirty="0">
+                <a:cs typeface="Calibri"/>
+              </a:rPr>
+              <a:t>AC power source (Socket)</a:t>
+            </a:r>
+          </a:p>
+          <a:p>
+            <a:r>
+              <a:rPr lang="en-US" dirty="0">
+                <a:cs typeface="Calibri"/>
+              </a:rPr>
+              <a:t>Breadboard (for prototyping)</a:t>
             </a:r>
           </a:p>
         </p:txBody>
@@ -3388,7 +3429,7 @@
     </p:spTree>
     <p:extLst>
       <p:ext uri="{BB962C8B-B14F-4D97-AF65-F5344CB8AC3E}">
-        <p14:creationId xmlns:p14="http://schemas.microsoft.com/office/powerpoint/2010/main" val="1819586671"/>
+        <p14:creationId xmlns:p14="http://schemas.microsoft.com/office/powerpoint/2010/main" val="776806907"/>
       </p:ext>
     </p:extLst>
   </p:cSld>
@@ -3427,119 +3468,445 @@
           <a:chExt cx="0" cy="0"/>
         </a:xfrm>
       </p:grpSpPr>
-      <p:sp>
-        <p:nvSpPr>
-          <p:cNvPr id="2" name="Title 1"/>
-          <p:cNvSpPr>
-            <a:spLocks noGrp="1"/>
-          </p:cNvSpPr>
-          <p:nvPr>
-            <p:ph type="title"/>
-          </p:nvPr>
-        </p:nvSpPr>
-        <p:spPr>
-          <a:xfrm>
-            <a:off x="838200" y="1401647"/>
-            <a:ext cx="10515600" cy="879865"/>
-          </a:xfrm>
-        </p:spPr>
-        <p:txBody>
-          <a:bodyPr/>
-          <a:lstStyle/>
-          <a:p>
-            <a:pPr algn="ctr"/>
-            <a:r>
-              <a:rPr lang="en-US" b="1" dirty="0">
-                <a:cs typeface="Calibri Light"/>
-              </a:rPr>
-              <a:t>Components involved</a:t>
-            </a:r>
-          </a:p>
-        </p:txBody>
-      </p:sp>
-      <p:sp>
-        <p:nvSpPr>
-          <p:cNvPr id="3" name="Content Placeholder 2"/>
-          <p:cNvSpPr>
-            <a:spLocks noGrp="1"/>
-          </p:cNvSpPr>
-          <p:nvPr>
-            <p:ph idx="1"/>
-          </p:nvPr>
-        </p:nvSpPr>
-        <p:spPr>
-          <a:xfrm>
-            <a:off x="838200" y="2295829"/>
-            <a:ext cx="10515600" cy="3881133"/>
-          </a:xfrm>
-        </p:spPr>
-        <p:txBody>
-          <a:bodyPr vert="horz" lIns="91440" tIns="45720" rIns="91440" bIns="45720" rtlCol="0" anchor="t">
-            <a:normAutofit/>
+      <p:pic>
+        <p:nvPicPr>
+          <p:cNvPr id="4" name="Picture 4" descr="A picture containing wrench, device&#10;&#10;Description automatically generated">
+            <a:extLst>
+              <a:ext uri="{FF2B5EF4-FFF2-40B4-BE49-F238E27FC236}">
+                <a16:creationId xmlns:a16="http://schemas.microsoft.com/office/drawing/2014/main" id="{2490B114-576E-4681-B3A7-A6C5E5513BEA}"/>
+              </a:ext>
+            </a:extLst>
+          </p:cNvPr>
+          <p:cNvPicPr>
+            <a:picLocks noChangeAspect="1"/>
+          </p:cNvPicPr>
+          <p:nvPr/>
+        </p:nvPicPr>
+        <p:blipFill>
+          <a:blip r:embed="rId2"/>
+          <a:stretch>
+            <a:fillRect/>
+          </a:stretch>
+        </p:blipFill>
+        <p:spPr>
+          <a:xfrm>
+            <a:off x="66136" y="1393489"/>
+            <a:ext cx="2455653" cy="2043815"/>
+          </a:xfrm>
+          <a:prstGeom prst="rect">
+            <a:avLst/>
+          </a:prstGeom>
+        </p:spPr>
+      </p:pic>
+      <p:pic>
+        <p:nvPicPr>
+          <p:cNvPr id="5" name="Picture 5">
+            <a:extLst>
+              <a:ext uri="{FF2B5EF4-FFF2-40B4-BE49-F238E27FC236}">
+                <a16:creationId xmlns:a16="http://schemas.microsoft.com/office/drawing/2014/main" id="{43C24F79-0A22-4DDB-8A2B-8A89B88ACEA9}"/>
+              </a:ext>
+            </a:extLst>
+          </p:cNvPr>
+          <p:cNvPicPr>
+            <a:picLocks noChangeAspect="1"/>
+          </p:cNvPicPr>
+          <p:nvPr/>
+        </p:nvPicPr>
+        <p:blipFill>
+          <a:blip r:embed="rId3"/>
+          <a:stretch>
+            <a:fillRect/>
+          </a:stretch>
+        </p:blipFill>
+        <p:spPr>
+          <a:xfrm>
+            <a:off x="4120551" y="1667056"/>
+            <a:ext cx="2656936" cy="2043022"/>
+          </a:xfrm>
+          <a:prstGeom prst="rect">
+            <a:avLst/>
+          </a:prstGeom>
+        </p:spPr>
+      </p:pic>
+      <p:pic>
+        <p:nvPicPr>
+          <p:cNvPr id="6" name="Picture 6" descr="A picture containing text, electronics, circuit&#10;&#10;Description automatically generated">
+            <a:extLst>
+              <a:ext uri="{FF2B5EF4-FFF2-40B4-BE49-F238E27FC236}">
+                <a16:creationId xmlns:a16="http://schemas.microsoft.com/office/drawing/2014/main" id="{662F0711-B52C-4005-B350-BF55C46CF4BA}"/>
+              </a:ext>
+            </a:extLst>
+          </p:cNvPr>
+          <p:cNvPicPr>
+            <a:picLocks noChangeAspect="1"/>
+          </p:cNvPicPr>
+          <p:nvPr/>
+        </p:nvPicPr>
+        <p:blipFill>
+          <a:blip r:embed="rId4"/>
+          <a:stretch>
+            <a:fillRect/>
+          </a:stretch>
+        </p:blipFill>
+        <p:spPr>
+          <a:xfrm>
+            <a:off x="8218098" y="1476307"/>
+            <a:ext cx="2383767" cy="2093839"/>
+          </a:xfrm>
+          <a:prstGeom prst="rect">
+            <a:avLst/>
+          </a:prstGeom>
+        </p:spPr>
+      </p:pic>
+      <p:pic>
+        <p:nvPicPr>
+          <p:cNvPr id="7" name="Picture 7" descr="A picture containing light, white&#10;&#10;Description automatically generated">
+            <a:extLst>
+              <a:ext uri="{FF2B5EF4-FFF2-40B4-BE49-F238E27FC236}">
+                <a16:creationId xmlns:a16="http://schemas.microsoft.com/office/drawing/2014/main" id="{C71D173B-00D8-4B32-B98C-16D7E614B80E}"/>
+              </a:ext>
+            </a:extLst>
+          </p:cNvPr>
+          <p:cNvPicPr>
+            <a:picLocks noChangeAspect="1"/>
+          </p:cNvPicPr>
+          <p:nvPr/>
+        </p:nvPicPr>
+        <p:blipFill>
+          <a:blip r:embed="rId5"/>
+          <a:stretch>
+            <a:fillRect/>
+          </a:stretch>
+        </p:blipFill>
+        <p:spPr>
+          <a:xfrm>
+            <a:off x="439947" y="3906160"/>
+            <a:ext cx="2081842" cy="2309340"/>
+          </a:xfrm>
+          <a:prstGeom prst="rect">
+            <a:avLst/>
+          </a:prstGeom>
+        </p:spPr>
+      </p:pic>
+      <p:pic>
+        <p:nvPicPr>
+          <p:cNvPr id="8" name="Picture 8">
+            <a:extLst>
+              <a:ext uri="{FF2B5EF4-FFF2-40B4-BE49-F238E27FC236}">
+                <a16:creationId xmlns:a16="http://schemas.microsoft.com/office/drawing/2014/main" id="{9DAD5E48-9F22-4BAE-A671-2954CFA6C5C5}"/>
+              </a:ext>
+            </a:extLst>
+          </p:cNvPr>
+          <p:cNvPicPr>
+            <a:picLocks noChangeAspect="1"/>
+          </p:cNvPicPr>
+          <p:nvPr/>
+        </p:nvPicPr>
+        <p:blipFill>
+          <a:blip r:embed="rId6"/>
+          <a:stretch>
+            <a:fillRect/>
+          </a:stretch>
+        </p:blipFill>
+        <p:spPr>
+          <a:xfrm>
+            <a:off x="4120552" y="4172921"/>
+            <a:ext cx="2484408" cy="2250273"/>
+          </a:xfrm>
+          <a:prstGeom prst="rect">
+            <a:avLst/>
+          </a:prstGeom>
+        </p:spPr>
+      </p:pic>
+      <p:pic>
+        <p:nvPicPr>
+          <p:cNvPr id="9" name="Picture 9" descr="A picture containing kite, sky, flying, colorful&#10;&#10;Description automatically generated">
+            <a:extLst>
+              <a:ext uri="{FF2B5EF4-FFF2-40B4-BE49-F238E27FC236}">
+                <a16:creationId xmlns:a16="http://schemas.microsoft.com/office/drawing/2014/main" id="{DFEEFB1C-C76B-4A69-9D79-E2D3CDCA199E}"/>
+              </a:ext>
+            </a:extLst>
+          </p:cNvPr>
+          <p:cNvPicPr>
+            <a:picLocks noChangeAspect="1"/>
+          </p:cNvPicPr>
+          <p:nvPr/>
+        </p:nvPicPr>
+        <p:blipFill>
+          <a:blip r:embed="rId7"/>
+          <a:stretch>
+            <a:fillRect/>
+          </a:stretch>
+        </p:blipFill>
+        <p:spPr>
+          <a:xfrm>
+            <a:off x="8275607" y="3561116"/>
+            <a:ext cx="3203275" cy="2985050"/>
+          </a:xfrm>
+          <a:prstGeom prst="rect">
+            <a:avLst/>
+          </a:prstGeom>
+        </p:spPr>
+      </p:pic>
+      <p:sp>
+        <p:nvSpPr>
+          <p:cNvPr id="10" name="TextBox 9">
+            <a:extLst>
+              <a:ext uri="{FF2B5EF4-FFF2-40B4-BE49-F238E27FC236}">
+                <a16:creationId xmlns:a16="http://schemas.microsoft.com/office/drawing/2014/main" id="{C472B63B-5548-49C8-8D59-F12651338BD2}"/>
+              </a:ext>
+            </a:extLst>
+          </p:cNvPr>
+          <p:cNvSpPr txBox="1"/>
+          <p:nvPr/>
+        </p:nvSpPr>
+        <p:spPr>
+          <a:xfrm>
+            <a:off x="1115683" y="2682816"/>
+            <a:ext cx="1938068" cy="369332"/>
+          </a:xfrm>
+          <a:prstGeom prst="rect">
+            <a:avLst/>
+          </a:prstGeom>
+          <a:noFill/>
+        </p:spPr>
+        <p:txBody>
+          <a:bodyPr rot="0" spcFirstLastPara="0" vertOverflow="overflow" horzOverflow="overflow" vert="horz" wrap="square" lIns="91440" tIns="45720" rIns="91440" bIns="45720" numCol="1" spcCol="0" rtlCol="0" fromWordArt="0" anchor="t" anchorCtr="0" forceAA="0" compatLnSpc="1">
+            <a:prstTxWarp prst="textNoShape">
+              <a:avLst/>
+            </a:prstTxWarp>
+            <a:spAutoFit/>
           </a:bodyPr>
           <a:lstStyle/>
           <a:p>
             <a:r>
-              <a:rPr lang="en-US" dirty="0">
-                <a:cs typeface="Calibri"/>
-              </a:rPr>
-              <a:t>Arduino UNO R3 Board</a:t>
-            </a:r>
-          </a:p>
-          <a:p>
-            <a:r>
-              <a:rPr lang="en-US" dirty="0">
-                <a:cs typeface="Calibri"/>
-              </a:rPr>
-              <a:t>Relay</a:t>
-            </a:r>
-          </a:p>
-          <a:p>
-            <a:r>
-              <a:rPr lang="en-US" dirty="0">
-                <a:cs typeface="Calibri"/>
-              </a:rPr>
+              <a:rPr lang="en-US" b="1" dirty="0"/>
+              <a:t>IR Receiver sensor</a:t>
+            </a:r>
+            <a:endParaRPr lang="en-US" b="1" dirty="0">
+              <a:cs typeface="Calibri"/>
+            </a:endParaRPr>
+          </a:p>
+        </p:txBody>
+      </p:sp>
+      <p:sp>
+        <p:nvSpPr>
+          <p:cNvPr id="11" name="TextBox 10">
+            <a:extLst>
+              <a:ext uri="{FF2B5EF4-FFF2-40B4-BE49-F238E27FC236}">
+                <a16:creationId xmlns:a16="http://schemas.microsoft.com/office/drawing/2014/main" id="{0938B96B-8278-4048-B18C-4F13B1DE0279}"/>
+              </a:ext>
+            </a:extLst>
+          </p:cNvPr>
+          <p:cNvSpPr txBox="1"/>
+          <p:nvPr/>
+        </p:nvSpPr>
+        <p:spPr>
+          <a:xfrm>
+            <a:off x="4709124" y="3616445"/>
+            <a:ext cx="2383767" cy="369332"/>
+          </a:xfrm>
+          <a:prstGeom prst="rect">
+            <a:avLst/>
+          </a:prstGeom>
+          <a:noFill/>
+        </p:spPr>
+        <p:txBody>
+          <a:bodyPr rot="0" spcFirstLastPara="0" vertOverflow="overflow" horzOverflow="overflow" vert="horz" wrap="square" lIns="91440" tIns="45720" rIns="91440" bIns="45720" numCol="1" spcCol="0" rtlCol="0" fromWordArt="0" anchor="t" anchorCtr="0" forceAA="0" compatLnSpc="1">
+            <a:prstTxWarp prst="textNoShape">
+              <a:avLst/>
+            </a:prstTxWarp>
+            <a:spAutoFit/>
+          </a:bodyPr>
+          <a:lstStyle/>
+          <a:p>
+            <a:r>
+              <a:rPr lang="en-US" b="1" dirty="0"/>
+              <a:t>Arduino UNO R3 board</a:t>
+            </a:r>
+            <a:endParaRPr lang="en-US" b="1" dirty="0">
+              <a:cs typeface="Calibri"/>
+            </a:endParaRPr>
+          </a:p>
+        </p:txBody>
+      </p:sp>
+      <p:sp>
+        <p:nvSpPr>
+          <p:cNvPr id="12" name="TextBox 11">
+            <a:extLst>
+              <a:ext uri="{FF2B5EF4-FFF2-40B4-BE49-F238E27FC236}">
+                <a16:creationId xmlns:a16="http://schemas.microsoft.com/office/drawing/2014/main" id="{DE059942-9125-4DA1-B1C6-8D885A8C48A4}"/>
+              </a:ext>
+            </a:extLst>
+          </p:cNvPr>
+          <p:cNvSpPr txBox="1"/>
+          <p:nvPr/>
+        </p:nvSpPr>
+        <p:spPr>
+          <a:xfrm>
+            <a:off x="9452754" y="2867924"/>
+            <a:ext cx="2283125" cy="369332"/>
+          </a:xfrm>
+          <a:prstGeom prst="rect">
+            <a:avLst/>
+          </a:prstGeom>
+          <a:noFill/>
+        </p:spPr>
+        <p:txBody>
+          <a:bodyPr rot="0" spcFirstLastPara="0" vertOverflow="overflow" horzOverflow="overflow" vert="horz" wrap="square" lIns="91440" tIns="45720" rIns="91440" bIns="45720" numCol="1" spcCol="0" rtlCol="0" fromWordArt="0" anchor="t" anchorCtr="0" forceAA="0" compatLnSpc="1">
+            <a:prstTxWarp prst="textNoShape">
+              <a:avLst/>
+            </a:prstTxWarp>
+            <a:spAutoFit/>
+          </a:bodyPr>
+          <a:lstStyle/>
+          <a:p>
+            <a:r>
+              <a:rPr lang="en-US" b="1" dirty="0"/>
+              <a:t>Relay Module (1 </a:t>
+            </a:r>
+            <a:r>
+              <a:rPr lang="en-US" b="1" dirty="0" err="1"/>
+              <a:t>ch</a:t>
+            </a:r>
+            <a:r>
+              <a:rPr lang="en-US" b="1" dirty="0"/>
+              <a:t>)</a:t>
+            </a:r>
+            <a:endParaRPr lang="en-US" b="1" dirty="0">
+              <a:cs typeface="Calibri"/>
+            </a:endParaRPr>
+          </a:p>
+        </p:txBody>
+      </p:sp>
+      <p:sp>
+        <p:nvSpPr>
+          <p:cNvPr id="13" name="TextBox 12">
+            <a:extLst>
+              <a:ext uri="{FF2B5EF4-FFF2-40B4-BE49-F238E27FC236}">
+                <a16:creationId xmlns:a16="http://schemas.microsoft.com/office/drawing/2014/main" id="{4F837010-59A3-418C-8587-B31E30B2D97B}"/>
+              </a:ext>
+            </a:extLst>
+          </p:cNvPr>
+          <p:cNvSpPr txBox="1"/>
+          <p:nvPr/>
+        </p:nvSpPr>
+        <p:spPr>
+          <a:xfrm>
+            <a:off x="983591" y="6202572"/>
+            <a:ext cx="1463616" cy="369332"/>
+          </a:xfrm>
+          <a:prstGeom prst="rect">
+            <a:avLst/>
+          </a:prstGeom>
+          <a:noFill/>
+        </p:spPr>
+        <p:txBody>
+          <a:bodyPr rot="0" spcFirstLastPara="0" vertOverflow="overflow" horzOverflow="overflow" vert="horz" wrap="square" lIns="91440" tIns="45720" rIns="91440" bIns="45720" numCol="1" spcCol="0" rtlCol="0" fromWordArt="0" anchor="t" anchorCtr="0" forceAA="0" compatLnSpc="1">
+            <a:prstTxWarp prst="textNoShape">
+              <a:avLst/>
+            </a:prstTxWarp>
+            <a:spAutoFit/>
+          </a:bodyPr>
+          <a:lstStyle/>
+          <a:p>
+            <a:r>
+              <a:rPr lang="en-US" b="1" dirty="0"/>
               <a:t>AC Bulb</a:t>
             </a:r>
-          </a:p>
-          <a:p>
-            <a:r>
-              <a:rPr lang="en-US" dirty="0">
-                <a:cs typeface="Calibri"/>
-              </a:rPr>
-              <a:t>IR Receiver sensor</a:t>
-            </a:r>
-          </a:p>
-          <a:p>
-            <a:r>
-              <a:rPr lang="en-US" dirty="0">
-                <a:cs typeface="Calibri"/>
-              </a:rPr>
-              <a:t>Jumpers and connecting wires</a:t>
-            </a:r>
-          </a:p>
-          <a:p>
-            <a:r>
-              <a:rPr lang="en-US" dirty="0">
-                <a:cs typeface="Calibri"/>
-              </a:rPr>
-              <a:t>AC power source (Socket)</a:t>
-            </a:r>
-          </a:p>
-          <a:p>
-            <a:r>
-              <a:rPr lang="en-US" dirty="0">
-                <a:cs typeface="Calibri"/>
-              </a:rPr>
-              <a:t>Breadboard (for prototyping)</a:t>
-            </a:r>
+            <a:endParaRPr lang="en-US" b="1" dirty="0">
+              <a:cs typeface="Calibri"/>
+            </a:endParaRPr>
+          </a:p>
+        </p:txBody>
+      </p:sp>
+      <p:sp>
+        <p:nvSpPr>
+          <p:cNvPr id="14" name="TextBox 13">
+            <a:extLst>
+              <a:ext uri="{FF2B5EF4-FFF2-40B4-BE49-F238E27FC236}">
+                <a16:creationId xmlns:a16="http://schemas.microsoft.com/office/drawing/2014/main" id="{FF1DA02B-8CED-4EA3-A704-85810007D8B6}"/>
+              </a:ext>
+            </a:extLst>
+          </p:cNvPr>
+          <p:cNvSpPr txBox="1"/>
+          <p:nvPr/>
+        </p:nvSpPr>
+        <p:spPr>
+          <a:xfrm>
+            <a:off x="3728768" y="6201674"/>
+            <a:ext cx="1708031" cy="369332"/>
+          </a:xfrm>
+          <a:prstGeom prst="rect">
+            <a:avLst/>
+          </a:prstGeom>
+          <a:noFill/>
+        </p:spPr>
+        <p:txBody>
+          <a:bodyPr rot="0" spcFirstLastPara="0" vertOverflow="overflow" horzOverflow="overflow" vert="horz" wrap="square" lIns="91440" tIns="45720" rIns="91440" bIns="45720" numCol="1" spcCol="0" rtlCol="0" fromWordArt="0" anchor="t" anchorCtr="0" forceAA="0" compatLnSpc="1">
+            <a:prstTxWarp prst="textNoShape">
+              <a:avLst/>
+            </a:prstTxWarp>
+            <a:spAutoFit/>
+          </a:bodyPr>
+          <a:lstStyle/>
+          <a:p>
+            <a:pPr algn="l"/>
+            <a:r>
+              <a:rPr lang="en-US" b="1" dirty="0"/>
+              <a:t>Breadboard</a:t>
+            </a:r>
+            <a:endParaRPr lang="en-US" b="1" dirty="0">
+              <a:cs typeface="Calibri"/>
+            </a:endParaRPr>
+          </a:p>
+        </p:txBody>
+      </p:sp>
+      <p:sp>
+        <p:nvSpPr>
+          <p:cNvPr id="15" name="TextBox 14">
+            <a:extLst>
+              <a:ext uri="{FF2B5EF4-FFF2-40B4-BE49-F238E27FC236}">
+                <a16:creationId xmlns:a16="http://schemas.microsoft.com/office/drawing/2014/main" id="{9710169D-6056-442E-AE7F-22A7D234EFAF}"/>
+              </a:ext>
+            </a:extLst>
+          </p:cNvPr>
+          <p:cNvSpPr txBox="1"/>
+          <p:nvPr/>
+        </p:nvSpPr>
+        <p:spPr>
+          <a:xfrm>
+            <a:off x="10499605" y="5898850"/>
+            <a:ext cx="1132936" cy="369332"/>
+          </a:xfrm>
+          <a:prstGeom prst="rect">
+            <a:avLst/>
+          </a:prstGeom>
+          <a:noFill/>
+        </p:spPr>
+        <p:txBody>
+          <a:bodyPr rot="0" spcFirstLastPara="0" vertOverflow="overflow" horzOverflow="overflow" vert="horz" wrap="square" lIns="91440" tIns="45720" rIns="91440" bIns="45720" numCol="1" spcCol="0" rtlCol="0" fromWordArt="0" anchor="t" anchorCtr="0" forceAA="0" compatLnSpc="1">
+            <a:prstTxWarp prst="textNoShape">
+              <a:avLst/>
+            </a:prstTxWarp>
+            <a:spAutoFit/>
+          </a:bodyPr>
+          <a:lstStyle/>
+          <a:p>
+            <a:r>
+              <a:rPr lang="en-US" b="1" dirty="0"/>
+              <a:t>Jumpers</a:t>
+            </a:r>
+            <a:endParaRPr lang="en-US" b="1" dirty="0">
+              <a:cs typeface="Calibri"/>
+            </a:endParaRPr>
           </a:p>
         </p:txBody>
       </p:sp>
     </p:spTree>
     <p:extLst>
       <p:ext uri="{BB962C8B-B14F-4D97-AF65-F5344CB8AC3E}">
-        <p14:creationId xmlns:p14="http://schemas.microsoft.com/office/powerpoint/2010/main" val="776806907"/>
+        <p14:creationId xmlns:p14="http://schemas.microsoft.com/office/powerpoint/2010/main" val="2875481910"/>
       </p:ext>
     </p:extLst>
   </p:cSld>
@@ -3578,445 +3945,135 @@
           <a:chExt cx="0" cy="0"/>
         </a:xfrm>
       </p:grpSpPr>
-      <p:pic>
-        <p:nvPicPr>
-          <p:cNvPr id="4" name="Picture 4" descr="A picture containing wrench, device&#10;&#10;Description automatically generated">
+      <p:sp>
+        <p:nvSpPr>
+          <p:cNvPr id="2" name="Title 1">
             <a:extLst>
               <a:ext uri="{FF2B5EF4-FFF2-40B4-BE49-F238E27FC236}">
-                <a16:creationId xmlns:a16="http://schemas.microsoft.com/office/drawing/2014/main" id="{2490B114-576E-4681-B3A7-A6C5E5513BEA}"/>
+                <a16:creationId xmlns:a16="http://schemas.microsoft.com/office/drawing/2014/main" id="{4430A82F-C774-406F-9402-6BC52C7AABF8}"/>
               </a:ext>
             </a:extLst>
           </p:cNvPr>
-          <p:cNvPicPr>
-            <a:picLocks noChangeAspect="1"/>
-          </p:cNvPicPr>
-          <p:nvPr/>
-        </p:nvPicPr>
-        <p:blipFill>
-          <a:blip r:embed="rId2"/>
-          <a:stretch>
-            <a:fillRect/>
-          </a:stretch>
-        </p:blipFill>
-        <p:spPr>
-          <a:xfrm>
-            <a:off x="66136" y="1393489"/>
-            <a:ext cx="2455653" cy="2043815"/>
-          </a:xfrm>
-          <a:prstGeom prst="rect">
-            <a:avLst/>
-          </a:prstGeom>
-        </p:spPr>
-      </p:pic>
-      <p:pic>
-        <p:nvPicPr>
-          <p:cNvPr id="5" name="Picture 5">
+          <p:cNvSpPr>
+            <a:spLocks noGrp="1"/>
+          </p:cNvSpPr>
+          <p:nvPr>
+            <p:ph type="title"/>
+          </p:nvPr>
+        </p:nvSpPr>
+        <p:spPr>
+          <a:xfrm>
+            <a:off x="838200" y="1401647"/>
+            <a:ext cx="10515600" cy="750469"/>
+          </a:xfrm>
+        </p:spPr>
+        <p:txBody>
+          <a:bodyPr/>
+          <a:lstStyle/>
+          <a:p>
+            <a:pPr algn="ctr"/>
+            <a:r>
+              <a:rPr lang="en-US" b="1" dirty="0">
+                <a:cs typeface="Calibri Light"/>
+              </a:rPr>
+              <a:t>Working Principle of a Relay</a:t>
+            </a:r>
+          </a:p>
+        </p:txBody>
+      </p:sp>
+      <p:sp>
+        <p:nvSpPr>
+          <p:cNvPr id="3" name="Content Placeholder 2">
             <a:extLst>
               <a:ext uri="{FF2B5EF4-FFF2-40B4-BE49-F238E27FC236}">
-                <a16:creationId xmlns:a16="http://schemas.microsoft.com/office/drawing/2014/main" id="{43C24F79-0A22-4DDB-8A2B-8A89B88ACEA9}"/>
+                <a16:creationId xmlns:a16="http://schemas.microsoft.com/office/drawing/2014/main" id="{DD359D6D-3433-42F4-B18C-9D9A0441F868}"/>
               </a:ext>
             </a:extLst>
           </p:cNvPr>
-          <p:cNvPicPr>
-            <a:picLocks noChangeAspect="1"/>
-          </p:cNvPicPr>
-          <p:nvPr/>
-        </p:nvPicPr>
-        <p:blipFill>
-          <a:blip r:embed="rId3"/>
-          <a:stretch>
-            <a:fillRect/>
-          </a:stretch>
-        </p:blipFill>
-        <p:spPr>
-          <a:xfrm>
-            <a:off x="4120551" y="1667056"/>
-            <a:ext cx="2656936" cy="2043022"/>
-          </a:xfrm>
-          <a:prstGeom prst="rect">
-            <a:avLst/>
-          </a:prstGeom>
-        </p:spPr>
-      </p:pic>
-      <p:pic>
-        <p:nvPicPr>
-          <p:cNvPr id="6" name="Picture 6" descr="A picture containing text, electronics, circuit&#10;&#10;Description automatically generated">
-            <a:extLst>
-              <a:ext uri="{FF2B5EF4-FFF2-40B4-BE49-F238E27FC236}">
-                <a16:creationId xmlns:a16="http://schemas.microsoft.com/office/drawing/2014/main" id="{662F0711-B52C-4005-B350-BF55C46CF4BA}"/>
-              </a:ext>
-            </a:extLst>
-          </p:cNvPr>
-          <p:cNvPicPr>
-            <a:picLocks noChangeAspect="1"/>
-          </p:cNvPicPr>
-          <p:nvPr/>
-        </p:nvPicPr>
-        <p:blipFill>
-          <a:blip r:embed="rId4"/>
-          <a:stretch>
-            <a:fillRect/>
-          </a:stretch>
-        </p:blipFill>
-        <p:spPr>
-          <a:xfrm>
-            <a:off x="8218098" y="1476307"/>
-            <a:ext cx="2383767" cy="2093839"/>
-          </a:xfrm>
-          <a:prstGeom prst="rect">
-            <a:avLst/>
-          </a:prstGeom>
-        </p:spPr>
-      </p:pic>
-      <p:pic>
-        <p:nvPicPr>
-          <p:cNvPr id="7" name="Picture 7" descr="A picture containing light, white&#10;&#10;Description automatically generated">
-            <a:extLst>
-              <a:ext uri="{FF2B5EF4-FFF2-40B4-BE49-F238E27FC236}">
-                <a16:creationId xmlns:a16="http://schemas.microsoft.com/office/drawing/2014/main" id="{C71D173B-00D8-4B32-B98C-16D7E614B80E}"/>
-              </a:ext>
-            </a:extLst>
-          </p:cNvPr>
-          <p:cNvPicPr>
-            <a:picLocks noChangeAspect="1"/>
-          </p:cNvPicPr>
-          <p:nvPr/>
-        </p:nvPicPr>
-        <p:blipFill>
-          <a:blip r:embed="rId5"/>
-          <a:stretch>
-            <a:fillRect/>
-          </a:stretch>
-        </p:blipFill>
-        <p:spPr>
-          <a:xfrm>
-            <a:off x="439947" y="3906160"/>
-            <a:ext cx="2081842" cy="2309340"/>
-          </a:xfrm>
-          <a:prstGeom prst="rect">
-            <a:avLst/>
-          </a:prstGeom>
-        </p:spPr>
-      </p:pic>
-      <p:pic>
-        <p:nvPicPr>
-          <p:cNvPr id="8" name="Picture 8">
-            <a:extLst>
-              <a:ext uri="{FF2B5EF4-FFF2-40B4-BE49-F238E27FC236}">
-                <a16:creationId xmlns:a16="http://schemas.microsoft.com/office/drawing/2014/main" id="{9DAD5E48-9F22-4BAE-A671-2954CFA6C5C5}"/>
-              </a:ext>
-            </a:extLst>
-          </p:cNvPr>
-          <p:cNvPicPr>
-            <a:picLocks noChangeAspect="1"/>
-          </p:cNvPicPr>
-          <p:nvPr/>
-        </p:nvPicPr>
-        <p:blipFill>
-          <a:blip r:embed="rId6"/>
-          <a:stretch>
-            <a:fillRect/>
-          </a:stretch>
-        </p:blipFill>
-        <p:spPr>
-          <a:xfrm>
-            <a:off x="4120552" y="4172921"/>
-            <a:ext cx="2484408" cy="2250273"/>
-          </a:xfrm>
-          <a:prstGeom prst="rect">
-            <a:avLst/>
-          </a:prstGeom>
-        </p:spPr>
-      </p:pic>
-      <p:pic>
-        <p:nvPicPr>
-          <p:cNvPr id="9" name="Picture 9" descr="A picture containing kite, sky, flying, colorful&#10;&#10;Description automatically generated">
-            <a:extLst>
-              <a:ext uri="{FF2B5EF4-FFF2-40B4-BE49-F238E27FC236}">
-                <a16:creationId xmlns:a16="http://schemas.microsoft.com/office/drawing/2014/main" id="{DFEEFB1C-C76B-4A69-9D79-E2D3CDCA199E}"/>
-              </a:ext>
-            </a:extLst>
-          </p:cNvPr>
-          <p:cNvPicPr>
-            <a:picLocks noChangeAspect="1"/>
-          </p:cNvPicPr>
-          <p:nvPr/>
-        </p:nvPicPr>
-        <p:blipFill>
-          <a:blip r:embed="rId7"/>
-          <a:stretch>
-            <a:fillRect/>
-          </a:stretch>
-        </p:blipFill>
-        <p:spPr>
-          <a:xfrm>
-            <a:off x="8275607" y="3561116"/>
-            <a:ext cx="3203275" cy="2985050"/>
-          </a:xfrm>
-          <a:prstGeom prst="rect">
-            <a:avLst/>
-          </a:prstGeom>
-        </p:spPr>
-      </p:pic>
-      <p:sp>
-        <p:nvSpPr>
-          <p:cNvPr id="10" name="TextBox 9">
-            <a:extLst>
-              <a:ext uri="{FF2B5EF4-FFF2-40B4-BE49-F238E27FC236}">
-                <a16:creationId xmlns:a16="http://schemas.microsoft.com/office/drawing/2014/main" id="{C472B63B-5548-49C8-8D59-F12651338BD2}"/>
-              </a:ext>
-            </a:extLst>
-          </p:cNvPr>
-          <p:cNvSpPr txBox="1"/>
-          <p:nvPr/>
-        </p:nvSpPr>
-        <p:spPr>
-          <a:xfrm>
-            <a:off x="1115683" y="2682816"/>
-            <a:ext cx="1938068" cy="369332"/>
-          </a:xfrm>
-          <a:prstGeom prst="rect">
-            <a:avLst/>
-          </a:prstGeom>
-          <a:noFill/>
-        </p:spPr>
-        <p:txBody>
-          <a:bodyPr rot="0" spcFirstLastPara="0" vertOverflow="overflow" horzOverflow="overflow" vert="horz" wrap="square" lIns="91440" tIns="45720" rIns="91440" bIns="45720" numCol="1" spcCol="0" rtlCol="0" fromWordArt="0" anchor="t" anchorCtr="0" forceAA="0" compatLnSpc="1">
-            <a:prstTxWarp prst="textNoShape">
-              <a:avLst/>
-            </a:prstTxWarp>
-            <a:spAutoFit/>
+          <p:cNvSpPr>
+            <a:spLocks noGrp="1"/>
+          </p:cNvSpPr>
+          <p:nvPr>
+            <p:ph idx="1"/>
+          </p:nvPr>
+        </p:nvSpPr>
+        <p:spPr>
+          <a:xfrm>
+            <a:off x="838200" y="2295829"/>
+            <a:ext cx="10515600" cy="3881133"/>
+          </a:xfrm>
+        </p:spPr>
+        <p:txBody>
+          <a:bodyPr vert="horz" lIns="91440" tIns="45720" rIns="91440" bIns="45720" rtlCol="0" anchor="t">
+            <a:normAutofit/>
           </a:bodyPr>
           <a:lstStyle/>
           <a:p>
             <a:r>
-              <a:rPr lang="en-US" b="1" dirty="0"/>
-              <a:t>IR Receiver sensor</a:t>
-            </a:r>
-            <a:endParaRPr lang="en-US" b="1" dirty="0">
-              <a:cs typeface="Calibri"/>
-            </a:endParaRPr>
-          </a:p>
-        </p:txBody>
-      </p:sp>
-      <p:sp>
-        <p:nvSpPr>
-          <p:cNvPr id="11" name="TextBox 10">
-            <a:extLst>
-              <a:ext uri="{FF2B5EF4-FFF2-40B4-BE49-F238E27FC236}">
-                <a16:creationId xmlns:a16="http://schemas.microsoft.com/office/drawing/2014/main" id="{0938B96B-8278-4048-B18C-4F13B1DE0279}"/>
-              </a:ext>
-            </a:extLst>
-          </p:cNvPr>
-          <p:cNvSpPr txBox="1"/>
-          <p:nvPr/>
-        </p:nvSpPr>
-        <p:spPr>
-          <a:xfrm>
-            <a:off x="4709124" y="3616445"/>
-            <a:ext cx="2383767" cy="369332"/>
-          </a:xfrm>
-          <a:prstGeom prst="rect">
-            <a:avLst/>
-          </a:prstGeom>
-          <a:noFill/>
-        </p:spPr>
-        <p:txBody>
-          <a:bodyPr rot="0" spcFirstLastPara="0" vertOverflow="overflow" horzOverflow="overflow" vert="horz" wrap="square" lIns="91440" tIns="45720" rIns="91440" bIns="45720" numCol="1" spcCol="0" rtlCol="0" fromWordArt="0" anchor="t" anchorCtr="0" forceAA="0" compatLnSpc="1">
-            <a:prstTxWarp prst="textNoShape">
-              <a:avLst/>
-            </a:prstTxWarp>
-            <a:spAutoFit/>
-          </a:bodyPr>
-          <a:lstStyle/>
-          <a:p>
-            <a:r>
-              <a:rPr lang="en-US" b="1" dirty="0"/>
-              <a:t>Arduino UNO R3 board</a:t>
-            </a:r>
-            <a:endParaRPr lang="en-US" b="1" dirty="0">
-              <a:cs typeface="Calibri"/>
-            </a:endParaRPr>
-          </a:p>
-        </p:txBody>
-      </p:sp>
-      <p:sp>
-        <p:nvSpPr>
-          <p:cNvPr id="12" name="TextBox 11">
-            <a:extLst>
-              <a:ext uri="{FF2B5EF4-FFF2-40B4-BE49-F238E27FC236}">
-                <a16:creationId xmlns:a16="http://schemas.microsoft.com/office/drawing/2014/main" id="{DE059942-9125-4DA1-B1C6-8D885A8C48A4}"/>
-              </a:ext>
-            </a:extLst>
-          </p:cNvPr>
-          <p:cNvSpPr txBox="1"/>
-          <p:nvPr/>
-        </p:nvSpPr>
-        <p:spPr>
-          <a:xfrm>
-            <a:off x="9452754" y="2867924"/>
-            <a:ext cx="2283125" cy="369332"/>
-          </a:xfrm>
-          <a:prstGeom prst="rect">
-            <a:avLst/>
-          </a:prstGeom>
-          <a:noFill/>
-        </p:spPr>
-        <p:txBody>
-          <a:bodyPr rot="0" spcFirstLastPara="0" vertOverflow="overflow" horzOverflow="overflow" vert="horz" wrap="square" lIns="91440" tIns="45720" rIns="91440" bIns="45720" numCol="1" spcCol="0" rtlCol="0" fromWordArt="0" anchor="t" anchorCtr="0" forceAA="0" compatLnSpc="1">
-            <a:prstTxWarp prst="textNoShape">
-              <a:avLst/>
-            </a:prstTxWarp>
-            <a:spAutoFit/>
-          </a:bodyPr>
-          <a:lstStyle/>
-          <a:p>
-            <a:r>
-              <a:rPr lang="en-US" b="1" dirty="0"/>
-              <a:t>Relay Module (1 </a:t>
-            </a:r>
-            <a:r>
-              <a:rPr lang="en-US" b="1" dirty="0" err="1"/>
-              <a:t>ch</a:t>
-            </a:r>
-            <a:r>
-              <a:rPr lang="en-US" b="1" dirty="0"/>
-              <a:t>)</a:t>
-            </a:r>
-            <a:endParaRPr lang="en-US" b="1" dirty="0">
-              <a:cs typeface="Calibri"/>
-            </a:endParaRPr>
-          </a:p>
-        </p:txBody>
-      </p:sp>
-      <p:sp>
-        <p:nvSpPr>
-          <p:cNvPr id="13" name="TextBox 12">
-            <a:extLst>
-              <a:ext uri="{FF2B5EF4-FFF2-40B4-BE49-F238E27FC236}">
-                <a16:creationId xmlns:a16="http://schemas.microsoft.com/office/drawing/2014/main" id="{4F837010-59A3-418C-8587-B31E30B2D97B}"/>
-              </a:ext>
-            </a:extLst>
-          </p:cNvPr>
-          <p:cNvSpPr txBox="1"/>
-          <p:nvPr/>
-        </p:nvSpPr>
-        <p:spPr>
-          <a:xfrm>
-            <a:off x="983591" y="6202572"/>
-            <a:ext cx="1463616" cy="369332"/>
-          </a:xfrm>
-          <a:prstGeom prst="rect">
-            <a:avLst/>
-          </a:prstGeom>
-          <a:noFill/>
-        </p:spPr>
-        <p:txBody>
-          <a:bodyPr rot="0" spcFirstLastPara="0" vertOverflow="overflow" horzOverflow="overflow" vert="horz" wrap="square" lIns="91440" tIns="45720" rIns="91440" bIns="45720" numCol="1" spcCol="0" rtlCol="0" fromWordArt="0" anchor="t" anchorCtr="0" forceAA="0" compatLnSpc="1">
-            <a:prstTxWarp prst="textNoShape">
-              <a:avLst/>
-            </a:prstTxWarp>
-            <a:spAutoFit/>
-          </a:bodyPr>
-          <a:lstStyle/>
-          <a:p>
-            <a:r>
-              <a:rPr lang="en-US" b="1" dirty="0"/>
-              <a:t>AC Bulb</a:t>
-            </a:r>
-            <a:endParaRPr lang="en-US" b="1" dirty="0">
-              <a:cs typeface="Calibri"/>
-            </a:endParaRPr>
-          </a:p>
-        </p:txBody>
-      </p:sp>
-      <p:sp>
-        <p:nvSpPr>
-          <p:cNvPr id="14" name="TextBox 13">
-            <a:extLst>
-              <a:ext uri="{FF2B5EF4-FFF2-40B4-BE49-F238E27FC236}">
-                <a16:creationId xmlns:a16="http://schemas.microsoft.com/office/drawing/2014/main" id="{FF1DA02B-8CED-4EA3-A704-85810007D8B6}"/>
-              </a:ext>
-            </a:extLst>
-          </p:cNvPr>
-          <p:cNvSpPr txBox="1"/>
-          <p:nvPr/>
-        </p:nvSpPr>
-        <p:spPr>
-          <a:xfrm>
-            <a:off x="3728768" y="6201674"/>
-            <a:ext cx="1708031" cy="369332"/>
-          </a:xfrm>
-          <a:prstGeom prst="rect">
-            <a:avLst/>
-          </a:prstGeom>
-          <a:noFill/>
-        </p:spPr>
-        <p:txBody>
-          <a:bodyPr rot="0" spcFirstLastPara="0" vertOverflow="overflow" horzOverflow="overflow" vert="horz" wrap="square" lIns="91440" tIns="45720" rIns="91440" bIns="45720" numCol="1" spcCol="0" rtlCol="0" fromWordArt="0" anchor="t" anchorCtr="0" forceAA="0" compatLnSpc="1">
-            <a:prstTxWarp prst="textNoShape">
-              <a:avLst/>
-            </a:prstTxWarp>
-            <a:spAutoFit/>
-          </a:bodyPr>
-          <a:lstStyle/>
-          <a:p>
-            <a:pPr algn="l"/>
-            <a:r>
-              <a:rPr lang="en-US" b="1" dirty="0"/>
-              <a:t>Breadboard</a:t>
-            </a:r>
-            <a:endParaRPr lang="en-US" b="1" dirty="0">
-              <a:cs typeface="Calibri"/>
-            </a:endParaRPr>
-          </a:p>
-        </p:txBody>
-      </p:sp>
-      <p:sp>
-        <p:nvSpPr>
-          <p:cNvPr id="15" name="TextBox 14">
-            <a:extLst>
-              <a:ext uri="{FF2B5EF4-FFF2-40B4-BE49-F238E27FC236}">
-                <a16:creationId xmlns:a16="http://schemas.microsoft.com/office/drawing/2014/main" id="{9710169D-6056-442E-AE7F-22A7D234EFAF}"/>
-              </a:ext>
-            </a:extLst>
-          </p:cNvPr>
-          <p:cNvSpPr txBox="1"/>
-          <p:nvPr/>
-        </p:nvSpPr>
-        <p:spPr>
-          <a:xfrm>
-            <a:off x="10499605" y="5898850"/>
-            <a:ext cx="1132936" cy="369332"/>
-          </a:xfrm>
-          <a:prstGeom prst="rect">
-            <a:avLst/>
-          </a:prstGeom>
-          <a:noFill/>
-        </p:spPr>
-        <p:txBody>
-          <a:bodyPr rot="0" spcFirstLastPara="0" vertOverflow="overflow" horzOverflow="overflow" vert="horz" wrap="square" lIns="91440" tIns="45720" rIns="91440" bIns="45720" numCol="1" spcCol="0" rtlCol="0" fromWordArt="0" anchor="t" anchorCtr="0" forceAA="0" compatLnSpc="1">
-            <a:prstTxWarp prst="textNoShape">
-              <a:avLst/>
-            </a:prstTxWarp>
-            <a:spAutoFit/>
-          </a:bodyPr>
-          <a:lstStyle/>
-          <a:p>
-            <a:r>
-              <a:rPr lang="en-US" b="1" dirty="0"/>
-              <a:t>Jumpers</a:t>
-            </a:r>
-            <a:endParaRPr lang="en-US" b="1" dirty="0">
-              <a:cs typeface="Calibri"/>
-            </a:endParaRPr>
+              <a:rPr lang="en-US" dirty="0">
+                <a:cs typeface="Calibri"/>
+              </a:rPr>
+              <a:t>It works on the principle of an electromagnetic attraction.</a:t>
+            </a:r>
+          </a:p>
+          <a:p>
+            <a:r>
+              <a:rPr lang="en-US" dirty="0">
+                <a:cs typeface="Calibri"/>
+              </a:rPr>
+              <a:t>When the circuit of the relay senses the fault current, it </a:t>
+            </a:r>
+            <a:r>
+              <a:rPr lang="en-US">
+                <a:cs typeface="Calibri"/>
+              </a:rPr>
+              <a:t>energizes</a:t>
+            </a:r>
+            <a:r>
+              <a:rPr lang="en-US" dirty="0">
+                <a:cs typeface="Calibri"/>
+              </a:rPr>
+              <a:t> </a:t>
+            </a:r>
+            <a:r>
+              <a:rPr lang="en-US">
+                <a:cs typeface="Calibri"/>
+              </a:rPr>
+              <a:t>the</a:t>
+            </a:r>
+            <a:r>
+              <a:rPr lang="en-US" dirty="0">
+                <a:cs typeface="Calibri"/>
+              </a:rPr>
+              <a:t> electromagnetic field which produces the temporary magnetic field.</a:t>
+            </a:r>
+          </a:p>
+          <a:p>
+            <a:r>
+              <a:rPr lang="en-US" dirty="0">
+                <a:cs typeface="Calibri"/>
+              </a:rPr>
+              <a:t>This magnetic field moves the relay </a:t>
+            </a:r>
+            <a:r>
+              <a:rPr lang="en-US">
+                <a:cs typeface="Calibri"/>
+              </a:rPr>
+              <a:t>armature</a:t>
+            </a:r>
+            <a:r>
+              <a:rPr lang="en-US" dirty="0">
+                <a:cs typeface="Calibri"/>
+              </a:rPr>
+              <a:t> for opening of closing the connection.</a:t>
+            </a:r>
           </a:p>
         </p:txBody>
       </p:sp>
     </p:spTree>
     <p:extLst>
       <p:ext uri="{BB962C8B-B14F-4D97-AF65-F5344CB8AC3E}">
-        <p14:creationId xmlns:p14="http://schemas.microsoft.com/office/powerpoint/2010/main" val="2875481910"/>
+        <p14:creationId xmlns:p14="http://schemas.microsoft.com/office/powerpoint/2010/main" val="3227370275"/>
       </p:ext>
     </p:extLst>
   </p:cSld>
@@ -4055,135 +4112,40 @@
           <a:chExt cx="0" cy="0"/>
         </a:xfrm>
       </p:grpSpPr>
-      <p:sp>
-        <p:nvSpPr>
-          <p:cNvPr id="2" name="Title 1">
+      <p:pic>
+        <p:nvPicPr>
+          <p:cNvPr id="4" name="Picture 4" descr="Diagram, schematic&#10;&#10;Description automatically generated">
             <a:extLst>
               <a:ext uri="{FF2B5EF4-FFF2-40B4-BE49-F238E27FC236}">
-                <a16:creationId xmlns:a16="http://schemas.microsoft.com/office/drawing/2014/main" id="{4430A82F-C774-406F-9402-6BC52C7AABF8}"/>
+                <a16:creationId xmlns:a16="http://schemas.microsoft.com/office/drawing/2014/main" id="{D98F92DA-0927-443D-8964-EE9542F4475C}"/>
               </a:ext>
             </a:extLst>
           </p:cNvPr>
-          <p:cNvSpPr>
-            <a:spLocks noGrp="1"/>
-          </p:cNvSpPr>
-          <p:nvPr>
-            <p:ph type="title"/>
-          </p:nvPr>
-        </p:nvSpPr>
-        <p:spPr>
-          <a:xfrm>
-            <a:off x="838200" y="1401647"/>
-            <a:ext cx="10515600" cy="750469"/>
-          </a:xfrm>
-        </p:spPr>
-        <p:txBody>
-          <a:bodyPr/>
-          <a:lstStyle/>
-          <a:p>
-            <a:pPr algn="ctr"/>
-            <a:r>
-              <a:rPr lang="en-US" b="1" dirty="0">
-                <a:cs typeface="Calibri Light"/>
-              </a:rPr>
-              <a:t>Working Principle of a Relay</a:t>
-            </a:r>
-          </a:p>
-        </p:txBody>
-      </p:sp>
-      <p:sp>
-        <p:nvSpPr>
-          <p:cNvPr id="3" name="Content Placeholder 2">
-            <a:extLst>
-              <a:ext uri="{FF2B5EF4-FFF2-40B4-BE49-F238E27FC236}">
-                <a16:creationId xmlns:a16="http://schemas.microsoft.com/office/drawing/2014/main" id="{DD359D6D-3433-42F4-B18C-9D9A0441F868}"/>
-              </a:ext>
-            </a:extLst>
-          </p:cNvPr>
-          <p:cNvSpPr>
-            <a:spLocks noGrp="1"/>
-          </p:cNvSpPr>
-          <p:nvPr>
-            <p:ph idx="1"/>
-          </p:nvPr>
-        </p:nvSpPr>
-        <p:spPr>
-          <a:xfrm>
-            <a:off x="838200" y="2295829"/>
-            <a:ext cx="10515600" cy="3881133"/>
-          </a:xfrm>
-        </p:spPr>
-        <p:txBody>
-          <a:bodyPr vert="horz" lIns="91440" tIns="45720" rIns="91440" bIns="45720" rtlCol="0" anchor="t">
-            <a:normAutofit/>
-          </a:bodyPr>
-          <a:lstStyle/>
-          <a:p>
-            <a:r>
-              <a:rPr lang="en-US" dirty="0">
-                <a:cs typeface="Calibri"/>
-              </a:rPr>
-              <a:t>It works on the principle of an electromagnetic attraction.</a:t>
-            </a:r>
-          </a:p>
-          <a:p>
-            <a:r>
-              <a:rPr lang="en-US" dirty="0">
-                <a:cs typeface="Calibri"/>
-              </a:rPr>
-              <a:t>When the circuit of the relay senses the fault current, it </a:t>
-            </a:r>
-            <a:r>
-              <a:rPr lang="en-US" dirty="0" err="1">
-                <a:cs typeface="Calibri"/>
-              </a:rPr>
-              <a:t>energises</a:t>
-            </a:r>
-            <a:r>
-              <a:rPr lang="en-US" dirty="0">
-                <a:cs typeface="Calibri"/>
-              </a:rPr>
-              <a:t> the </a:t>
-            </a:r>
-            <a:r>
-              <a:rPr lang="en-US" dirty="0" err="1">
-                <a:cs typeface="Calibri"/>
-              </a:rPr>
-              <a:t>the</a:t>
-            </a:r>
-            <a:r>
-              <a:rPr lang="en-US" dirty="0">
-                <a:cs typeface="Calibri"/>
-              </a:rPr>
-              <a:t> electromagnetic field which produces the temporary magnetic field.</a:t>
-            </a:r>
-          </a:p>
-          <a:p>
-            <a:r>
-              <a:rPr lang="en-US" dirty="0">
-                <a:cs typeface="Calibri"/>
-              </a:rPr>
-              <a:t>This magnetic field moves the relay </a:t>
-            </a:r>
-            <a:r>
-              <a:rPr lang="en-US" dirty="0" err="1">
-                <a:cs typeface="Calibri"/>
-              </a:rPr>
-              <a:t>amarture</a:t>
-            </a:r>
-            <a:r>
-              <a:rPr lang="en-US" dirty="0">
-                <a:cs typeface="Calibri"/>
-              </a:rPr>
-              <a:t> for opening of closing the connection.</a:t>
-            </a:r>
-          </a:p>
-        </p:txBody>
-      </p:sp>
+          <p:cNvPicPr>
+            <a:picLocks noChangeAspect="1"/>
+          </p:cNvPicPr>
+          <p:nvPr/>
+        </p:nvPicPr>
+        <p:blipFill>
+          <a:blip r:embed="rId2"/>
+          <a:stretch>
+            <a:fillRect/>
+          </a:stretch>
+        </p:blipFill>
+        <p:spPr>
+          <a:xfrm>
+            <a:off x="2711570" y="1719935"/>
+            <a:ext cx="6768859" cy="4597073"/>
+          </a:xfrm>
+          <a:prstGeom prst="rect">
+            <a:avLst/>
+          </a:prstGeom>
+        </p:spPr>
+      </p:pic>
     </p:spTree>
     <p:extLst>
       <p:ext uri="{BB962C8B-B14F-4D97-AF65-F5344CB8AC3E}">
-        <p14:creationId xmlns:p14="http://schemas.microsoft.com/office/powerpoint/2010/main" val="3227370275"/>
+        <p14:creationId xmlns:p14="http://schemas.microsoft.com/office/powerpoint/2010/main" val="2995805788"/>
       </p:ext>
     </p:extLst>
   </p:cSld>
@@ -4222,40 +4184,99 @@
           <a:chExt cx="0" cy="0"/>
         </a:xfrm>
       </p:grpSpPr>
-      <p:pic>
-        <p:nvPicPr>
-          <p:cNvPr id="4" name="Picture 4" descr="Diagram, schematic&#10;&#10;Description automatically generated">
+      <p:sp>
+        <p:nvSpPr>
+          <p:cNvPr id="2" name="Title 1">
             <a:extLst>
               <a:ext uri="{FF2B5EF4-FFF2-40B4-BE49-F238E27FC236}">
-                <a16:creationId xmlns:a16="http://schemas.microsoft.com/office/drawing/2014/main" id="{D98F92DA-0927-443D-8964-EE9542F4475C}"/>
+                <a16:creationId xmlns:a16="http://schemas.microsoft.com/office/drawing/2014/main" id="{4213BC6D-1460-4897-8B8B-69AFA038B123}"/>
               </a:ext>
             </a:extLst>
           </p:cNvPr>
-          <p:cNvPicPr>
-            <a:picLocks noChangeAspect="1"/>
-          </p:cNvPicPr>
-          <p:nvPr/>
-        </p:nvPicPr>
-        <p:blipFill>
-          <a:blip r:embed="rId2"/>
-          <a:stretch>
-            <a:fillRect/>
-          </a:stretch>
-        </p:blipFill>
-        <p:spPr>
-          <a:xfrm>
-            <a:off x="2711570" y="1719935"/>
-            <a:ext cx="6768859" cy="4597073"/>
-          </a:xfrm>
-          <a:prstGeom prst="rect">
-            <a:avLst/>
-          </a:prstGeom>
-        </p:spPr>
-      </p:pic>
+          <p:cNvSpPr>
+            <a:spLocks noGrp="1"/>
+          </p:cNvSpPr>
+          <p:nvPr>
+            <p:ph type="title"/>
+          </p:nvPr>
+        </p:nvSpPr>
+        <p:spPr>
+          <a:xfrm>
+            <a:off x="838200" y="1401647"/>
+            <a:ext cx="10515600" cy="1153035"/>
+          </a:xfrm>
+        </p:spPr>
+        <p:txBody>
+          <a:bodyPr/>
+          <a:lstStyle/>
+          <a:p>
+            <a:pPr algn="ctr"/>
+            <a:r>
+              <a:rPr lang="en-US" b="1" dirty="0">
+                <a:cs typeface="Calibri Light"/>
+              </a:rPr>
+              <a:t>Working Principle of IR Receiver Sensor</a:t>
+            </a:r>
+          </a:p>
+        </p:txBody>
+      </p:sp>
+      <p:sp>
+        <p:nvSpPr>
+          <p:cNvPr id="3" name="Content Placeholder 2">
+            <a:extLst>
+              <a:ext uri="{FF2B5EF4-FFF2-40B4-BE49-F238E27FC236}">
+                <a16:creationId xmlns:a16="http://schemas.microsoft.com/office/drawing/2014/main" id="{23A39E61-5753-452A-AC01-05F3AD76CFBB}"/>
+              </a:ext>
+            </a:extLst>
+          </p:cNvPr>
+          <p:cNvSpPr>
+            <a:spLocks noGrp="1"/>
+          </p:cNvSpPr>
+          <p:nvPr>
+            <p:ph idx="1"/>
+          </p:nvPr>
+        </p:nvSpPr>
+        <p:spPr>
+          <a:xfrm>
+            <a:off x="838200" y="2382093"/>
+            <a:ext cx="10515600" cy="3794869"/>
+          </a:xfrm>
+        </p:spPr>
+        <p:txBody>
+          <a:bodyPr vert="horz" lIns="91440" tIns="45720" rIns="91440" bIns="45720" rtlCol="0" anchor="t">
+            <a:normAutofit/>
+          </a:bodyPr>
+          <a:lstStyle/>
+          <a:p>
+            <a:r>
+              <a:rPr lang="en-US" dirty="0">
+                <a:cs typeface="Calibri"/>
+              </a:rPr>
+              <a:t>IR Receiver is also called a photodiode.</a:t>
+            </a:r>
+          </a:p>
+          <a:p>
+            <a:r>
+              <a:rPr lang="en-US" dirty="0">
+                <a:cs typeface="Calibri"/>
+              </a:rPr>
+              <a:t>The emitter is an IR LED and the detector is an IR photodiode.</a:t>
+            </a:r>
+          </a:p>
+          <a:p>
+            <a:r>
+              <a:rPr lang="en-US" dirty="0">
+                <a:cs typeface="Calibri"/>
+              </a:rPr>
+              <a:t>The IR photodiode is sensitive to the IR light emitted by an IR LED. The photodiode's resistance and output voltage change in proportion to the IR light received.</a:t>
+            </a:r>
+          </a:p>
+        </p:txBody>
+      </p:sp>
     </p:spTree>
     <p:extLst>
       <p:ext uri="{BB962C8B-B14F-4D97-AF65-F5344CB8AC3E}">
-        <p14:creationId xmlns:p14="http://schemas.microsoft.com/office/powerpoint/2010/main" val="2995805788"/>
+        <p14:creationId xmlns:p14="http://schemas.microsoft.com/office/powerpoint/2010/main" val="2462514724"/>
       </p:ext>
     </p:extLst>
   </p:cSld>
@@ -4294,137 +4315,6 @@
           <a:chExt cx="0" cy="0"/>
         </a:xfrm>
       </p:grpSpPr>
-      <p:sp>
-        <p:nvSpPr>
-          <p:cNvPr id="2" name="Title 1">
-            <a:extLst>
-              <a:ext uri="{FF2B5EF4-FFF2-40B4-BE49-F238E27FC236}">
-                <a16:creationId xmlns:a16="http://schemas.microsoft.com/office/drawing/2014/main" id="{4213BC6D-1460-4897-8B8B-69AFA038B123}"/>
-              </a:ext>
-            </a:extLst>
-          </p:cNvPr>
-          <p:cNvSpPr>
-            <a:spLocks noGrp="1"/>
-          </p:cNvSpPr>
-          <p:nvPr>
-            <p:ph type="title"/>
-          </p:nvPr>
-        </p:nvSpPr>
-        <p:spPr>
-          <a:xfrm>
-            <a:off x="838200" y="1401647"/>
-            <a:ext cx="10515600" cy="1153035"/>
-          </a:xfrm>
-        </p:spPr>
-        <p:txBody>
-          <a:bodyPr/>
-          <a:lstStyle/>
-          <a:p>
-            <a:pPr algn="ctr"/>
-            <a:r>
-              <a:rPr lang="en-US" b="1" dirty="0">
-                <a:cs typeface="Calibri Light"/>
-              </a:rPr>
-              <a:t>Working Principle of IR Receiver Sensor</a:t>
-            </a:r>
-          </a:p>
-        </p:txBody>
-      </p:sp>
-      <p:sp>
-        <p:nvSpPr>
-          <p:cNvPr id="3" name="Content Placeholder 2">
-            <a:extLst>
-              <a:ext uri="{FF2B5EF4-FFF2-40B4-BE49-F238E27FC236}">
-                <a16:creationId xmlns:a16="http://schemas.microsoft.com/office/drawing/2014/main" id="{23A39E61-5753-452A-AC01-05F3AD76CFBB}"/>
-              </a:ext>
-            </a:extLst>
-          </p:cNvPr>
-          <p:cNvSpPr>
-            <a:spLocks noGrp="1"/>
-          </p:cNvSpPr>
-          <p:nvPr>
-            <p:ph idx="1"/>
-          </p:nvPr>
-        </p:nvSpPr>
-        <p:spPr>
-          <a:xfrm>
-            <a:off x="838200" y="2382093"/>
-            <a:ext cx="10515600" cy="3794869"/>
-          </a:xfrm>
-        </p:spPr>
-        <p:txBody>
-          <a:bodyPr vert="horz" lIns="91440" tIns="45720" rIns="91440" bIns="45720" rtlCol="0" anchor="t">
-            <a:normAutofit/>
-          </a:bodyPr>
-          <a:lstStyle/>
-          <a:p>
-            <a:r>
-              <a:rPr lang="en-US" dirty="0">
-                <a:cs typeface="Calibri"/>
-              </a:rPr>
-              <a:t>IR Receiver is also called a photodiode.</a:t>
-            </a:r>
-          </a:p>
-          <a:p>
-            <a:r>
-              <a:rPr lang="en-US" dirty="0">
-                <a:cs typeface="Calibri"/>
-              </a:rPr>
-              <a:t>The emitter is an IR LED and the detector is an IR photodiode.</a:t>
-            </a:r>
-          </a:p>
-          <a:p>
-            <a:r>
-              <a:rPr lang="en-US" dirty="0">
-                <a:cs typeface="Calibri"/>
-              </a:rPr>
-              <a:t>The IR photodiode is sensitive to the IR light emitted by an IR LED. The photodiode's resistance and output voltage change in proportion to the IR light received.</a:t>
-            </a:r>
-          </a:p>
-        </p:txBody>
-      </p:sp>
-    </p:spTree>
-    <p:extLst>
-      <p:ext uri="{BB962C8B-B14F-4D97-AF65-F5344CB8AC3E}">
-        <p14:creationId xmlns:p14="http://schemas.microsoft.com/office/powerpoint/2010/main" val="2462514724"/>
-      </p:ext>
-    </p:extLst>
-  </p:cSld>
-  <p:clrMapOvr>
-    <a:masterClrMapping/>
-  </p:clrMapOvr>
-  <mc:AlternateContent xmlns:mc="http://schemas.openxmlformats.org/markup-compatibility/2006" xmlns:p14="http://schemas.microsoft.com/office/powerpoint/2010/main">
-    <mc:Choice Requires="p14">
-      <p:transition spd="med" p14:dur="700">
-        <p:fade/>
-      </p:transition>
-    </mc:Choice>
-    <mc:Fallback xmlns="">
-      <p:transition spd="med">
-        <p:fade/>
-      </p:transition>
-    </mc:Fallback>
-  </mc:AlternateContent>
-</p:sld>
-</file>
-
-<file path=ppt/slides/slide8.xml><?xml version="1.0" encoding="utf-8"?>
-<p:sld xmlns:a="http://schemas.openxmlformats.org/drawingml/2006/main" xmlns:r="http://schemas.openxmlformats.org/officeDocument/2006/relationships" xmlns:p="http://schemas.openxmlformats.org/presentationml/2006/main">
-  <p:cSld>
-    <p:spTree>
-      <p:nvGrpSpPr>
-        <p:cNvPr id="1" name=""/>
-        <p:cNvGrpSpPr/>
-        <p:nvPr/>
-      </p:nvGrpSpPr>
-      <p:grpSpPr>
-        <a:xfrm>
-          <a:off x="0" y="0"/>
-          <a:ext cx="0" cy="0"/>
-          <a:chOff x="0" y="0"/>
-          <a:chExt cx="0" cy="0"/>
-        </a:xfrm>
-      </p:grpSpPr>
       <p:pic>
         <p:nvPicPr>
           <p:cNvPr id="4" name="Picture 4" descr="Diagram&#10;&#10;Description automatically generated">
@@ -4480,7 +4370,7 @@
 </p:sld>
 </file>
 
-<file path=ppt/slides/slide9.xml><?xml version="1.0" encoding="utf-8"?>
+<file path=ppt/slides/slide8.xml><?xml version="1.0" encoding="utf-8"?>
 <p:sld xmlns:a="http://schemas.openxmlformats.org/drawingml/2006/main" xmlns:r="http://schemas.openxmlformats.org/officeDocument/2006/relationships" xmlns:p="http://schemas.openxmlformats.org/presentationml/2006/main">
   <p:cSld>
     <p:spTree>

</xml_diff>

<commit_message>
Major changes to the lectures
</commit_message>
<xml_diff>
--- a/Practicals/Project 2/Lecture/ppt/Project 2.pptx
+++ b/Practicals/Project 2/Lecture/ppt/Project 2.pptx
@@ -6,13 +6,15 @@
   </p:sldMasterIdLst>
   <p:sldIdLst>
     <p:sldId id="256" r:id="rId2"/>
-    <p:sldId id="258" r:id="rId3"/>
-    <p:sldId id="262" r:id="rId4"/>
-    <p:sldId id="259" r:id="rId5"/>
-    <p:sldId id="260" r:id="rId6"/>
-    <p:sldId id="261" r:id="rId7"/>
-    <p:sldId id="263" r:id="rId8"/>
-    <p:sldId id="264" r:id="rId9"/>
+    <p:sldId id="265" r:id="rId3"/>
+    <p:sldId id="258" r:id="rId4"/>
+    <p:sldId id="262" r:id="rId5"/>
+    <p:sldId id="261" r:id="rId6"/>
+    <p:sldId id="263" r:id="rId7"/>
+    <p:sldId id="266" r:id="rId8"/>
+    <p:sldId id="267" r:id="rId9"/>
+    <p:sldId id="268" r:id="rId10"/>
+    <p:sldId id="264" r:id="rId11"/>
   </p:sldIdLst>
   <p:sldSz cx="12192000" cy="6858000"/>
   <p:notesSz cx="6858000" cy="9144000"/>
@@ -122,6 +124,7 @@
 <file path=ppt/revisionInfo.xml><?xml version="1.0" encoding="utf-8"?>
 <p1510:revInfo xmlns:a="http://schemas.openxmlformats.org/drawingml/2006/main" xmlns:r="http://schemas.openxmlformats.org/officeDocument/2006/relationships" xmlns:p1510="http://schemas.microsoft.com/office/powerpoint/2015/10/main">
   <p1510:revLst>
+    <p1510:client id="{AC92633E-0931-4092-80DB-55FB2EE59EDA}" v="1336" dt="2021-03-29T21:36:00.662"/>
     <p1510:client id="{C24F83EB-9709-4366-8028-22F07D7EF90B}" v="1866" dt="2021-03-28T08:17:46.163"/>
   </p1510:revLst>
 </p1510:revInfo>
@@ -256,7 +259,7 @@
           <a:p>
             <a:fld id="{7EADE604-6095-4678-BC07-E2D82692C32E}" type="datetimeFigureOut">
               <a:rPr lang="en-US" smtClean="0"/>
-              <a:t>3/28/2021</a:t>
+              <a:t>3/29/2021</a:t>
             </a:fld>
             <a:endParaRPr lang="en-US"/>
           </a:p>
@@ -436,7 +439,7 @@
           <a:p>
             <a:fld id="{7EADE604-6095-4678-BC07-E2D82692C32E}" type="datetimeFigureOut">
               <a:rPr lang="en-US" smtClean="0"/>
-              <a:t>3/28/2021</a:t>
+              <a:t>3/29/2021</a:t>
             </a:fld>
             <a:endParaRPr lang="en-US"/>
           </a:p>
@@ -626,7 +629,7 @@
           <a:p>
             <a:fld id="{7EADE604-6095-4678-BC07-E2D82692C32E}" type="datetimeFigureOut">
               <a:rPr lang="en-US" smtClean="0"/>
-              <a:t>3/28/2021</a:t>
+              <a:t>3/29/2021</a:t>
             </a:fld>
             <a:endParaRPr lang="en-US"/>
           </a:p>
@@ -806,7 +809,7 @@
           <a:p>
             <a:fld id="{7EADE604-6095-4678-BC07-E2D82692C32E}" type="datetimeFigureOut">
               <a:rPr lang="en-US" smtClean="0"/>
-              <a:t>3/28/2021</a:t>
+              <a:t>3/29/2021</a:t>
             </a:fld>
             <a:endParaRPr lang="en-US"/>
           </a:p>
@@ -1063,7 +1066,7 @@
           <a:p>
             <a:fld id="{7EADE604-6095-4678-BC07-E2D82692C32E}" type="datetimeFigureOut">
               <a:rPr lang="en-US" smtClean="0"/>
-              <a:t>3/28/2021</a:t>
+              <a:t>3/29/2021</a:t>
             </a:fld>
             <a:endParaRPr lang="en-US"/>
           </a:p>
@@ -1304,7 +1307,7 @@
           <a:p>
             <a:fld id="{7EADE604-6095-4678-BC07-E2D82692C32E}" type="datetimeFigureOut">
               <a:rPr lang="en-US" smtClean="0"/>
-              <a:t>3/28/2021</a:t>
+              <a:t>3/29/2021</a:t>
             </a:fld>
             <a:endParaRPr lang="en-US"/>
           </a:p>
@@ -1680,7 +1683,7 @@
           <a:p>
             <a:fld id="{7EADE604-6095-4678-BC07-E2D82692C32E}" type="datetimeFigureOut">
               <a:rPr lang="en-US" smtClean="0"/>
-              <a:t>3/28/2021</a:t>
+              <a:t>3/29/2021</a:t>
             </a:fld>
             <a:endParaRPr lang="en-US"/>
           </a:p>
@@ -1809,7 +1812,7 @@
           <a:p>
             <a:fld id="{7EADE604-6095-4678-BC07-E2D82692C32E}" type="datetimeFigureOut">
               <a:rPr lang="en-US" smtClean="0"/>
-              <a:t>3/28/2021</a:t>
+              <a:t>3/29/2021</a:t>
             </a:fld>
             <a:endParaRPr lang="en-US"/>
           </a:p>
@@ -1916,7 +1919,7 @@
           <a:p>
             <a:fld id="{7EADE604-6095-4678-BC07-E2D82692C32E}" type="datetimeFigureOut">
               <a:rPr lang="en-US" smtClean="0"/>
-              <a:t>3/28/2021</a:t>
+              <a:t>3/29/2021</a:t>
             </a:fld>
             <a:endParaRPr lang="en-US"/>
           </a:p>
@@ -2203,7 +2206,7 @@
           <a:p>
             <a:fld id="{7EADE604-6095-4678-BC07-E2D82692C32E}" type="datetimeFigureOut">
               <a:rPr lang="en-US" smtClean="0"/>
-              <a:t>3/28/2021</a:t>
+              <a:t>3/29/2021</a:t>
             </a:fld>
             <a:endParaRPr lang="en-US"/>
           </a:p>
@@ -2467,7 +2470,7 @@
           <a:p>
             <a:fld id="{7EADE604-6095-4678-BC07-E2D82692C32E}" type="datetimeFigureOut">
               <a:rPr lang="en-US" smtClean="0"/>
-              <a:t>3/28/2021</a:t>
+              <a:t>3/29/2021</a:t>
             </a:fld>
             <a:endParaRPr lang="en-US"/>
           </a:p>
@@ -2690,7 +2693,7 @@
           <a:p>
             <a:fld id="{7EADE604-6095-4678-BC07-E2D82692C32E}" type="datetimeFigureOut">
               <a:rPr lang="en-US" smtClean="0"/>
-              <a:t>3/28/2021</a:t>
+              <a:t>3/29/2021</a:t>
             </a:fld>
             <a:endParaRPr lang="en-US"/>
           </a:p>
@@ -3275,10 +3278,124 @@
           </a:p>
         </p:txBody>
       </p:sp>
+      <p:sp>
+        <p:nvSpPr>
+          <p:cNvPr id="3" name="TextBox 2">
+            <a:extLst>
+              <a:ext uri="{FF2B5EF4-FFF2-40B4-BE49-F238E27FC236}">
+                <a16:creationId xmlns:a16="http://schemas.microsoft.com/office/drawing/2014/main" id="{4F415938-E7AD-449D-BDF4-E7F255BA82DF}"/>
+              </a:ext>
+            </a:extLst>
+          </p:cNvPr>
+          <p:cNvSpPr txBox="1"/>
+          <p:nvPr/>
+        </p:nvSpPr>
+        <p:spPr>
+          <a:xfrm>
+            <a:off x="4724400" y="2366513"/>
+            <a:ext cx="2743200" cy="923330"/>
+          </a:xfrm>
+          <a:prstGeom prst="rect">
+            <a:avLst/>
+          </a:prstGeom>
+          <a:noFill/>
+        </p:spPr>
+        <p:txBody>
+          <a:bodyPr rot="0" spcFirstLastPara="0" vertOverflow="overflow" horzOverflow="overflow" vert="horz" wrap="square" lIns="91440" tIns="45720" rIns="91440" bIns="45720" numCol="1" spcCol="0" rtlCol="0" fromWordArt="0" anchor="t" anchorCtr="0" forceAA="0" compatLnSpc="1">
+            <a:prstTxWarp prst="textNoShape">
+              <a:avLst/>
+            </a:prstTxWarp>
+            <a:spAutoFit/>
+          </a:bodyPr>
+          <a:lstStyle/>
+          <a:p>
+            <a:pPr algn="ctr"/>
+            <a:r>
+              <a:rPr lang="en-US" sz="5400" b="1"/>
+              <a:t>Project 2</a:t>
+            </a:r>
+            <a:endParaRPr lang="en-US" sz="5400" b="1">
+              <a:cs typeface="Calibri"/>
+            </a:endParaRPr>
+          </a:p>
+        </p:txBody>
+      </p:sp>
     </p:spTree>
     <p:extLst>
       <p:ext uri="{BB962C8B-B14F-4D97-AF65-F5344CB8AC3E}">
         <p14:creationId xmlns:p14="http://schemas.microsoft.com/office/powerpoint/2010/main" val="1585996340"/>
+      </p:ext>
+    </p:extLst>
+  </p:cSld>
+  <p:clrMapOvr>
+    <a:masterClrMapping/>
+  </p:clrMapOvr>
+  <mc:AlternateContent xmlns:mc="http://schemas.openxmlformats.org/markup-compatibility/2006" xmlns:p14="http://schemas.microsoft.com/office/powerpoint/2010/main">
+    <mc:Choice Requires="p14">
+      <p:transition spd="med" p14:dur="700">
+        <p:fade/>
+      </p:transition>
+    </mc:Choice>
+    <mc:Fallback xmlns="">
+      <p:transition spd="med">
+        <p:fade/>
+      </p:transition>
+    </mc:Fallback>
+  </mc:AlternateContent>
+</p:sld>
+</file>
+
+<file path=ppt/slides/slide10.xml><?xml version="1.0" encoding="utf-8"?>
+<p:sld xmlns:a="http://schemas.openxmlformats.org/drawingml/2006/main" xmlns:r="http://schemas.openxmlformats.org/officeDocument/2006/relationships" xmlns:p="http://schemas.openxmlformats.org/presentationml/2006/main">
+  <p:cSld>
+    <p:spTree>
+      <p:nvGrpSpPr>
+        <p:cNvPr id="1" name=""/>
+        <p:cNvGrpSpPr/>
+        <p:nvPr/>
+      </p:nvGrpSpPr>
+      <p:grpSpPr>
+        <a:xfrm>
+          <a:off x="0" y="0"/>
+          <a:ext cx="0" cy="0"/>
+          <a:chOff x="0" y="0"/>
+          <a:chExt cx="0" cy="0"/>
+        </a:xfrm>
+      </p:grpSpPr>
+      <p:pic>
+        <p:nvPicPr>
+          <p:cNvPr id="4" name="Picture 4" descr="Text, whiteboard&#10;&#10;Description automatically generated">
+            <a:extLst>
+              <a:ext uri="{FF2B5EF4-FFF2-40B4-BE49-F238E27FC236}">
+                <a16:creationId xmlns:a16="http://schemas.microsoft.com/office/drawing/2014/main" id="{7549BA95-D0DB-4279-9F7D-84A9988D736C}"/>
+              </a:ext>
+            </a:extLst>
+          </p:cNvPr>
+          <p:cNvPicPr>
+            <a:picLocks noChangeAspect="1"/>
+          </p:cNvPicPr>
+          <p:nvPr/>
+        </p:nvPicPr>
+        <p:blipFill>
+          <a:blip r:embed="rId2"/>
+          <a:stretch>
+            <a:fillRect/>
+          </a:stretch>
+        </p:blipFill>
+        <p:spPr>
+          <a:xfrm>
+            <a:off x="1877683" y="1551317"/>
+            <a:ext cx="8666670" cy="4991818"/>
+          </a:xfrm>
+          <a:prstGeom prst="rect">
+            <a:avLst/>
+          </a:prstGeom>
+        </p:spPr>
+      </p:pic>
+    </p:spTree>
+    <p:extLst>
+      <p:ext uri="{BB962C8B-B14F-4D97-AF65-F5344CB8AC3E}">
+        <p14:creationId xmlns:p14="http://schemas.microsoft.com/office/powerpoint/2010/main" val="3404698375"/>
       </p:ext>
     </p:extLst>
   </p:cSld>
@@ -3319,7 +3436,13 @@
       </p:grpSpPr>
       <p:sp>
         <p:nvSpPr>
-          <p:cNvPr id="2" name="Title 1"/>
+          <p:cNvPr id="2" name="Title 1">
+            <a:extLst>
+              <a:ext uri="{FF2B5EF4-FFF2-40B4-BE49-F238E27FC236}">
+                <a16:creationId xmlns:a16="http://schemas.microsoft.com/office/drawing/2014/main" id="{0F82AB60-B231-42F6-A31F-863752A63FBB}"/>
+              </a:ext>
+            </a:extLst>
+          </p:cNvPr>
           <p:cNvSpPr>
             <a:spLocks noGrp="1"/>
           </p:cNvSpPr>
@@ -3329,8 +3452,8 @@
         </p:nvSpPr>
         <p:spPr>
           <a:xfrm>
-            <a:off x="838200" y="1401647"/>
-            <a:ext cx="10515600" cy="879865"/>
+            <a:off x="3224842" y="1401647"/>
+            <a:ext cx="5957978" cy="721715"/>
           </a:xfrm>
         </p:spPr>
         <p:txBody>
@@ -3339,17 +3462,23 @@
           <a:p>
             <a:pPr algn="ctr"/>
             <a:r>
-              <a:rPr lang="en-US" b="1" dirty="0">
+              <a:rPr lang="en-US" b="1">
                 <a:cs typeface="Calibri Light"/>
               </a:rPr>
-              <a:t>Components involved</a:t>
-            </a:r>
-          </a:p>
-        </p:txBody>
-      </p:sp>
-      <p:sp>
-        <p:nvSpPr>
-          <p:cNvPr id="3" name="Content Placeholder 2"/>
+              <a:t>Project Description</a:t>
+            </a:r>
+          </a:p>
+        </p:txBody>
+      </p:sp>
+      <p:sp>
+        <p:nvSpPr>
+          <p:cNvPr id="3" name="Content Placeholder 2">
+            <a:extLst>
+              <a:ext uri="{FF2B5EF4-FFF2-40B4-BE49-F238E27FC236}">
+                <a16:creationId xmlns:a16="http://schemas.microsoft.com/office/drawing/2014/main" id="{A0FC0F58-1B74-4528-865F-4EED3F7E966B}"/>
+              </a:ext>
+            </a:extLst>
+          </p:cNvPr>
           <p:cNvSpPr>
             <a:spLocks noGrp="1"/>
           </p:cNvSpPr>
@@ -3359,8 +3488,8 @@
         </p:nvSpPr>
         <p:spPr>
           <a:xfrm>
-            <a:off x="838200" y="2295829"/>
-            <a:ext cx="10515600" cy="3881133"/>
+            <a:off x="838200" y="2180810"/>
+            <a:ext cx="10515600" cy="3996152"/>
           </a:xfrm>
         </p:spPr>
         <p:txBody>
@@ -3370,66 +3499,53 @@
           <a:lstStyle/>
           <a:p>
             <a:r>
+              <a:rPr lang="en-US">
+                <a:cs typeface="Calibri"/>
+              </a:rPr>
+              <a:t>This project aims at designing and implementing a Wireless Lighting System by which an LED (or bulb) is being controlled using an IR remote.</a:t>
+            </a:r>
+          </a:p>
+          <a:p>
+            <a:r>
+              <a:rPr lang="en-US">
+                <a:cs typeface="Calibri"/>
+              </a:rPr>
+              <a:t>The project uses the IR</a:t>
+            </a:r>
+            <a:r>
               <a:rPr lang="en-US" dirty="0">
                 <a:cs typeface="Calibri"/>
               </a:rPr>
-              <a:t>Arduino UNO R3 Board</a:t>
-            </a:r>
-          </a:p>
-          <a:p>
+              <a:t> </a:t>
+            </a:r>
+            <a:r>
+              <a:rPr lang="en-US">
+                <a:cs typeface="Calibri"/>
+              </a:rPr>
+              <a:t>receiver to demodulate or decode the IR signals from the IR remote, the</a:t>
+            </a:r>
             <a:r>
               <a:rPr lang="en-US" dirty="0">
                 <a:cs typeface="Calibri"/>
               </a:rPr>
-              <a:t>Relay</a:t>
-            </a:r>
-          </a:p>
-          <a:p>
-            <a:r>
-              <a:rPr lang="en-US" dirty="0">
+              <a:t> </a:t>
+            </a:r>
+            <a:r>
+              <a:rPr lang="en-US">
                 <a:cs typeface="Calibri"/>
               </a:rPr>
-              <a:t>AC Bulb</a:t>
-            </a:r>
-          </a:p>
-          <a:p>
-            <a:r>
-              <a:rPr lang="en-US" dirty="0">
-                <a:cs typeface="Calibri"/>
-              </a:rPr>
-              <a:t>IR Receiver sensor</a:t>
-            </a:r>
-          </a:p>
-          <a:p>
-            <a:r>
-              <a:rPr lang="en-US" dirty="0">
-                <a:cs typeface="Calibri"/>
-              </a:rPr>
-              <a:t>Jumpers and connecting wires</a:t>
-            </a:r>
-          </a:p>
-          <a:p>
-            <a:r>
-              <a:rPr lang="en-US" dirty="0">
-                <a:cs typeface="Calibri"/>
-              </a:rPr>
-              <a:t>AC power source (Socket)</a:t>
-            </a:r>
-          </a:p>
-          <a:p>
-            <a:r>
-              <a:rPr lang="en-US" dirty="0">
-                <a:cs typeface="Calibri"/>
-              </a:rPr>
-              <a:t>Breadboard (for prototyping)</a:t>
-            </a:r>
+              <a:t>signals (keys) are then printed on the serial monitor to show the pressed key.</a:t>
+            </a:r>
+            <a:endParaRPr lang="en-US" dirty="0">
+              <a:cs typeface="Calibri"/>
+            </a:endParaRPr>
           </a:p>
         </p:txBody>
       </p:sp>
     </p:spTree>
     <p:extLst>
       <p:ext uri="{BB962C8B-B14F-4D97-AF65-F5344CB8AC3E}">
-        <p14:creationId xmlns:p14="http://schemas.microsoft.com/office/powerpoint/2010/main" val="776806907"/>
+        <p14:creationId xmlns:p14="http://schemas.microsoft.com/office/powerpoint/2010/main" val="5648296"/>
       </p:ext>
     </p:extLst>
   </p:cSld>
@@ -3468,436 +3584,116 @@
           <a:chExt cx="0" cy="0"/>
         </a:xfrm>
       </p:grpSpPr>
-      <p:pic>
-        <p:nvPicPr>
-          <p:cNvPr id="4" name="Picture 4" descr="A picture containing wrench, device&#10;&#10;Description automatically generated">
-            <a:extLst>
-              <a:ext uri="{FF2B5EF4-FFF2-40B4-BE49-F238E27FC236}">
-                <a16:creationId xmlns:a16="http://schemas.microsoft.com/office/drawing/2014/main" id="{2490B114-576E-4681-B3A7-A6C5E5513BEA}"/>
-              </a:ext>
-            </a:extLst>
-          </p:cNvPr>
-          <p:cNvPicPr>
-            <a:picLocks noChangeAspect="1"/>
-          </p:cNvPicPr>
-          <p:nvPr/>
-        </p:nvPicPr>
-        <p:blipFill>
-          <a:blip r:embed="rId2"/>
-          <a:stretch>
-            <a:fillRect/>
-          </a:stretch>
-        </p:blipFill>
-        <p:spPr>
-          <a:xfrm>
-            <a:off x="66136" y="1393489"/>
-            <a:ext cx="2455653" cy="2043815"/>
-          </a:xfrm>
-          <a:prstGeom prst="rect">
-            <a:avLst/>
-          </a:prstGeom>
-        </p:spPr>
-      </p:pic>
-      <p:pic>
-        <p:nvPicPr>
-          <p:cNvPr id="5" name="Picture 5">
-            <a:extLst>
-              <a:ext uri="{FF2B5EF4-FFF2-40B4-BE49-F238E27FC236}">
-                <a16:creationId xmlns:a16="http://schemas.microsoft.com/office/drawing/2014/main" id="{43C24F79-0A22-4DDB-8A2B-8A89B88ACEA9}"/>
-              </a:ext>
-            </a:extLst>
-          </p:cNvPr>
-          <p:cNvPicPr>
-            <a:picLocks noChangeAspect="1"/>
-          </p:cNvPicPr>
-          <p:nvPr/>
-        </p:nvPicPr>
-        <p:blipFill>
-          <a:blip r:embed="rId3"/>
-          <a:stretch>
-            <a:fillRect/>
-          </a:stretch>
-        </p:blipFill>
-        <p:spPr>
-          <a:xfrm>
-            <a:off x="4120551" y="1667056"/>
-            <a:ext cx="2656936" cy="2043022"/>
-          </a:xfrm>
-          <a:prstGeom prst="rect">
-            <a:avLst/>
-          </a:prstGeom>
-        </p:spPr>
-      </p:pic>
-      <p:pic>
-        <p:nvPicPr>
-          <p:cNvPr id="6" name="Picture 6" descr="A picture containing text, electronics, circuit&#10;&#10;Description automatically generated">
-            <a:extLst>
-              <a:ext uri="{FF2B5EF4-FFF2-40B4-BE49-F238E27FC236}">
-                <a16:creationId xmlns:a16="http://schemas.microsoft.com/office/drawing/2014/main" id="{662F0711-B52C-4005-B350-BF55C46CF4BA}"/>
-              </a:ext>
-            </a:extLst>
-          </p:cNvPr>
-          <p:cNvPicPr>
-            <a:picLocks noChangeAspect="1"/>
-          </p:cNvPicPr>
-          <p:nvPr/>
-        </p:nvPicPr>
-        <p:blipFill>
-          <a:blip r:embed="rId4"/>
-          <a:stretch>
-            <a:fillRect/>
-          </a:stretch>
-        </p:blipFill>
-        <p:spPr>
-          <a:xfrm>
-            <a:off x="8218098" y="1476307"/>
-            <a:ext cx="2383767" cy="2093839"/>
-          </a:xfrm>
-          <a:prstGeom prst="rect">
-            <a:avLst/>
-          </a:prstGeom>
-        </p:spPr>
-      </p:pic>
-      <p:pic>
-        <p:nvPicPr>
-          <p:cNvPr id="7" name="Picture 7" descr="A picture containing light, white&#10;&#10;Description automatically generated">
-            <a:extLst>
-              <a:ext uri="{FF2B5EF4-FFF2-40B4-BE49-F238E27FC236}">
-                <a16:creationId xmlns:a16="http://schemas.microsoft.com/office/drawing/2014/main" id="{C71D173B-00D8-4B32-B98C-16D7E614B80E}"/>
-              </a:ext>
-            </a:extLst>
-          </p:cNvPr>
-          <p:cNvPicPr>
-            <a:picLocks noChangeAspect="1"/>
-          </p:cNvPicPr>
-          <p:nvPr/>
-        </p:nvPicPr>
-        <p:blipFill>
-          <a:blip r:embed="rId5"/>
-          <a:stretch>
-            <a:fillRect/>
-          </a:stretch>
-        </p:blipFill>
-        <p:spPr>
-          <a:xfrm>
-            <a:off x="439947" y="3906160"/>
-            <a:ext cx="2081842" cy="2309340"/>
-          </a:xfrm>
-          <a:prstGeom prst="rect">
-            <a:avLst/>
-          </a:prstGeom>
-        </p:spPr>
-      </p:pic>
-      <p:pic>
-        <p:nvPicPr>
-          <p:cNvPr id="8" name="Picture 8">
-            <a:extLst>
-              <a:ext uri="{FF2B5EF4-FFF2-40B4-BE49-F238E27FC236}">
-                <a16:creationId xmlns:a16="http://schemas.microsoft.com/office/drawing/2014/main" id="{9DAD5E48-9F22-4BAE-A671-2954CFA6C5C5}"/>
-              </a:ext>
-            </a:extLst>
-          </p:cNvPr>
-          <p:cNvPicPr>
-            <a:picLocks noChangeAspect="1"/>
-          </p:cNvPicPr>
-          <p:nvPr/>
-        </p:nvPicPr>
-        <p:blipFill>
-          <a:blip r:embed="rId6"/>
-          <a:stretch>
-            <a:fillRect/>
-          </a:stretch>
-        </p:blipFill>
-        <p:spPr>
-          <a:xfrm>
-            <a:off x="4120552" y="4172921"/>
-            <a:ext cx="2484408" cy="2250273"/>
-          </a:xfrm>
-          <a:prstGeom prst="rect">
-            <a:avLst/>
-          </a:prstGeom>
-        </p:spPr>
-      </p:pic>
-      <p:pic>
-        <p:nvPicPr>
-          <p:cNvPr id="9" name="Picture 9" descr="A picture containing kite, sky, flying, colorful&#10;&#10;Description automatically generated">
-            <a:extLst>
-              <a:ext uri="{FF2B5EF4-FFF2-40B4-BE49-F238E27FC236}">
-                <a16:creationId xmlns:a16="http://schemas.microsoft.com/office/drawing/2014/main" id="{DFEEFB1C-C76B-4A69-9D79-E2D3CDCA199E}"/>
-              </a:ext>
-            </a:extLst>
-          </p:cNvPr>
-          <p:cNvPicPr>
-            <a:picLocks noChangeAspect="1"/>
-          </p:cNvPicPr>
-          <p:nvPr/>
-        </p:nvPicPr>
-        <p:blipFill>
-          <a:blip r:embed="rId7"/>
-          <a:stretch>
-            <a:fillRect/>
-          </a:stretch>
-        </p:blipFill>
-        <p:spPr>
-          <a:xfrm>
-            <a:off x="8275607" y="3561116"/>
-            <a:ext cx="3203275" cy="2985050"/>
-          </a:xfrm>
-          <a:prstGeom prst="rect">
-            <a:avLst/>
-          </a:prstGeom>
-        </p:spPr>
-      </p:pic>
-      <p:sp>
-        <p:nvSpPr>
-          <p:cNvPr id="10" name="TextBox 9">
-            <a:extLst>
-              <a:ext uri="{FF2B5EF4-FFF2-40B4-BE49-F238E27FC236}">
-                <a16:creationId xmlns:a16="http://schemas.microsoft.com/office/drawing/2014/main" id="{C472B63B-5548-49C8-8D59-F12651338BD2}"/>
-              </a:ext>
-            </a:extLst>
-          </p:cNvPr>
-          <p:cNvSpPr txBox="1"/>
-          <p:nvPr/>
-        </p:nvSpPr>
-        <p:spPr>
-          <a:xfrm>
-            <a:off x="1115683" y="2682816"/>
-            <a:ext cx="1938068" cy="369332"/>
-          </a:xfrm>
-          <a:prstGeom prst="rect">
-            <a:avLst/>
-          </a:prstGeom>
-          <a:noFill/>
-        </p:spPr>
-        <p:txBody>
-          <a:bodyPr rot="0" spcFirstLastPara="0" vertOverflow="overflow" horzOverflow="overflow" vert="horz" wrap="square" lIns="91440" tIns="45720" rIns="91440" bIns="45720" numCol="1" spcCol="0" rtlCol="0" fromWordArt="0" anchor="t" anchorCtr="0" forceAA="0" compatLnSpc="1">
-            <a:prstTxWarp prst="textNoShape">
-              <a:avLst/>
-            </a:prstTxWarp>
-            <a:spAutoFit/>
+      <p:sp>
+        <p:nvSpPr>
+          <p:cNvPr id="2" name="Title 1"/>
+          <p:cNvSpPr>
+            <a:spLocks noGrp="1"/>
+          </p:cNvSpPr>
+          <p:nvPr>
+            <p:ph type="title"/>
+          </p:nvPr>
+        </p:nvSpPr>
+        <p:spPr>
+          <a:xfrm>
+            <a:off x="838200" y="1401647"/>
+            <a:ext cx="10515600" cy="879865"/>
+          </a:xfrm>
+        </p:spPr>
+        <p:txBody>
+          <a:bodyPr/>
+          <a:lstStyle/>
+          <a:p>
+            <a:pPr algn="ctr"/>
+            <a:r>
+              <a:rPr lang="en-US" b="1" dirty="0">
+                <a:cs typeface="Calibri Light"/>
+              </a:rPr>
+              <a:t>Components involved</a:t>
+            </a:r>
+          </a:p>
+        </p:txBody>
+      </p:sp>
+      <p:sp>
+        <p:nvSpPr>
+          <p:cNvPr id="3" name="Content Placeholder 2"/>
+          <p:cNvSpPr>
+            <a:spLocks noGrp="1"/>
+          </p:cNvSpPr>
+          <p:nvPr>
+            <p:ph idx="1"/>
+          </p:nvPr>
+        </p:nvSpPr>
+        <p:spPr>
+          <a:xfrm>
+            <a:off x="838200" y="2295829"/>
+            <a:ext cx="10515600" cy="3881133"/>
+          </a:xfrm>
+        </p:spPr>
+        <p:txBody>
+          <a:bodyPr vert="horz" lIns="91440" tIns="45720" rIns="91440" bIns="45720" rtlCol="0" anchor="t">
+            <a:normAutofit/>
           </a:bodyPr>
           <a:lstStyle/>
           <a:p>
             <a:r>
-              <a:rPr lang="en-US" b="1" dirty="0"/>
-              <a:t>IR Receiver sensor</a:t>
-            </a:r>
-            <a:endParaRPr lang="en-US" b="1" dirty="0">
+              <a:rPr lang="en-US" dirty="0">
+                <a:cs typeface="Calibri"/>
+              </a:rPr>
+              <a:t>Arduino UNO R3 Board</a:t>
+            </a:r>
+          </a:p>
+          <a:p>
+            <a:r>
+              <a:rPr lang="en-US">
+                <a:cs typeface="Calibri"/>
+              </a:rPr>
+              <a:t>IR remote</a:t>
+            </a:r>
+            <a:endParaRPr lang="en-US" dirty="0">
               <a:cs typeface="Calibri"/>
             </a:endParaRPr>
           </a:p>
-        </p:txBody>
-      </p:sp>
-      <p:sp>
-        <p:nvSpPr>
-          <p:cNvPr id="11" name="TextBox 10">
-            <a:extLst>
-              <a:ext uri="{FF2B5EF4-FFF2-40B4-BE49-F238E27FC236}">
-                <a16:creationId xmlns:a16="http://schemas.microsoft.com/office/drawing/2014/main" id="{0938B96B-8278-4048-B18C-4F13B1DE0279}"/>
-              </a:ext>
-            </a:extLst>
-          </p:cNvPr>
-          <p:cNvSpPr txBox="1"/>
-          <p:nvPr/>
-        </p:nvSpPr>
-        <p:spPr>
-          <a:xfrm>
-            <a:off x="4709124" y="3616445"/>
-            <a:ext cx="2383767" cy="369332"/>
-          </a:xfrm>
-          <a:prstGeom prst="rect">
-            <a:avLst/>
-          </a:prstGeom>
-          <a:noFill/>
-        </p:spPr>
-        <p:txBody>
-          <a:bodyPr rot="0" spcFirstLastPara="0" vertOverflow="overflow" horzOverflow="overflow" vert="horz" wrap="square" lIns="91440" tIns="45720" rIns="91440" bIns="45720" numCol="1" spcCol="0" rtlCol="0" fromWordArt="0" anchor="t" anchorCtr="0" forceAA="0" compatLnSpc="1">
-            <a:prstTxWarp prst="textNoShape">
-              <a:avLst/>
-            </a:prstTxWarp>
-            <a:spAutoFit/>
-          </a:bodyPr>
-          <a:lstStyle/>
-          <a:p>
-            <a:r>
-              <a:rPr lang="en-US" b="1" dirty="0"/>
-              <a:t>Arduino UNO R3 board</a:t>
-            </a:r>
-            <a:endParaRPr lang="en-US" b="1" dirty="0">
-              <a:cs typeface="Calibri"/>
-            </a:endParaRPr>
-          </a:p>
-        </p:txBody>
-      </p:sp>
-      <p:sp>
-        <p:nvSpPr>
-          <p:cNvPr id="12" name="TextBox 11">
-            <a:extLst>
-              <a:ext uri="{FF2B5EF4-FFF2-40B4-BE49-F238E27FC236}">
-                <a16:creationId xmlns:a16="http://schemas.microsoft.com/office/drawing/2014/main" id="{DE059942-9125-4DA1-B1C6-8D885A8C48A4}"/>
-              </a:ext>
-            </a:extLst>
-          </p:cNvPr>
-          <p:cNvSpPr txBox="1"/>
-          <p:nvPr/>
-        </p:nvSpPr>
-        <p:spPr>
-          <a:xfrm>
-            <a:off x="9452754" y="2867924"/>
-            <a:ext cx="2283125" cy="369332"/>
-          </a:xfrm>
-          <a:prstGeom prst="rect">
-            <a:avLst/>
-          </a:prstGeom>
-          <a:noFill/>
-        </p:spPr>
-        <p:txBody>
-          <a:bodyPr rot="0" spcFirstLastPara="0" vertOverflow="overflow" horzOverflow="overflow" vert="horz" wrap="square" lIns="91440" tIns="45720" rIns="91440" bIns="45720" numCol="1" spcCol="0" rtlCol="0" fromWordArt="0" anchor="t" anchorCtr="0" forceAA="0" compatLnSpc="1">
-            <a:prstTxWarp prst="textNoShape">
-              <a:avLst/>
-            </a:prstTxWarp>
-            <a:spAutoFit/>
-          </a:bodyPr>
-          <a:lstStyle/>
-          <a:p>
-            <a:r>
-              <a:rPr lang="en-US" b="1" dirty="0"/>
-              <a:t>Relay Module (1 </a:t>
-            </a:r>
-            <a:r>
-              <a:rPr lang="en-US" b="1" dirty="0" err="1"/>
-              <a:t>ch</a:t>
-            </a:r>
-            <a:r>
-              <a:rPr lang="en-US" b="1" dirty="0"/>
-              <a:t>)</a:t>
-            </a:r>
-            <a:endParaRPr lang="en-US" b="1" dirty="0">
-              <a:cs typeface="Calibri"/>
-            </a:endParaRPr>
-          </a:p>
-        </p:txBody>
-      </p:sp>
-      <p:sp>
-        <p:nvSpPr>
-          <p:cNvPr id="13" name="TextBox 12">
-            <a:extLst>
-              <a:ext uri="{FF2B5EF4-FFF2-40B4-BE49-F238E27FC236}">
-                <a16:creationId xmlns:a16="http://schemas.microsoft.com/office/drawing/2014/main" id="{4F837010-59A3-418C-8587-B31E30B2D97B}"/>
-              </a:ext>
-            </a:extLst>
-          </p:cNvPr>
-          <p:cNvSpPr txBox="1"/>
-          <p:nvPr/>
-        </p:nvSpPr>
-        <p:spPr>
-          <a:xfrm>
-            <a:off x="983591" y="6202572"/>
-            <a:ext cx="1463616" cy="369332"/>
-          </a:xfrm>
-          <a:prstGeom prst="rect">
-            <a:avLst/>
-          </a:prstGeom>
-          <a:noFill/>
-        </p:spPr>
-        <p:txBody>
-          <a:bodyPr rot="0" spcFirstLastPara="0" vertOverflow="overflow" horzOverflow="overflow" vert="horz" wrap="square" lIns="91440" tIns="45720" rIns="91440" bIns="45720" numCol="1" spcCol="0" rtlCol="0" fromWordArt="0" anchor="t" anchorCtr="0" forceAA="0" compatLnSpc="1">
-            <a:prstTxWarp prst="textNoShape">
-              <a:avLst/>
-            </a:prstTxWarp>
-            <a:spAutoFit/>
-          </a:bodyPr>
-          <a:lstStyle/>
-          <a:p>
-            <a:r>
-              <a:rPr lang="en-US" b="1" dirty="0"/>
-              <a:t>AC Bulb</a:t>
-            </a:r>
-            <a:endParaRPr lang="en-US" b="1" dirty="0">
-              <a:cs typeface="Calibri"/>
-            </a:endParaRPr>
-          </a:p>
-        </p:txBody>
-      </p:sp>
-      <p:sp>
-        <p:nvSpPr>
-          <p:cNvPr id="14" name="TextBox 13">
-            <a:extLst>
-              <a:ext uri="{FF2B5EF4-FFF2-40B4-BE49-F238E27FC236}">
-                <a16:creationId xmlns:a16="http://schemas.microsoft.com/office/drawing/2014/main" id="{FF1DA02B-8CED-4EA3-A704-85810007D8B6}"/>
-              </a:ext>
-            </a:extLst>
-          </p:cNvPr>
-          <p:cNvSpPr txBox="1"/>
-          <p:nvPr/>
-        </p:nvSpPr>
-        <p:spPr>
-          <a:xfrm>
-            <a:off x="3728768" y="6201674"/>
-            <a:ext cx="1708031" cy="369332"/>
-          </a:xfrm>
-          <a:prstGeom prst="rect">
-            <a:avLst/>
-          </a:prstGeom>
-          <a:noFill/>
-        </p:spPr>
-        <p:txBody>
-          <a:bodyPr rot="0" spcFirstLastPara="0" vertOverflow="overflow" horzOverflow="overflow" vert="horz" wrap="square" lIns="91440" tIns="45720" rIns="91440" bIns="45720" numCol="1" spcCol="0" rtlCol="0" fromWordArt="0" anchor="t" anchorCtr="0" forceAA="0" compatLnSpc="1">
-            <a:prstTxWarp prst="textNoShape">
-              <a:avLst/>
-            </a:prstTxWarp>
-            <a:spAutoFit/>
-          </a:bodyPr>
-          <a:lstStyle/>
-          <a:p>
-            <a:pPr algn="l"/>
-            <a:r>
-              <a:rPr lang="en-US" b="1" dirty="0"/>
-              <a:t>Breadboard</a:t>
-            </a:r>
-            <a:endParaRPr lang="en-US" b="1" dirty="0">
-              <a:cs typeface="Calibri"/>
-            </a:endParaRPr>
-          </a:p>
-        </p:txBody>
-      </p:sp>
-      <p:sp>
-        <p:nvSpPr>
-          <p:cNvPr id="15" name="TextBox 14">
-            <a:extLst>
-              <a:ext uri="{FF2B5EF4-FFF2-40B4-BE49-F238E27FC236}">
-                <a16:creationId xmlns:a16="http://schemas.microsoft.com/office/drawing/2014/main" id="{9710169D-6056-442E-AE7F-22A7D234EFAF}"/>
-              </a:ext>
-            </a:extLst>
-          </p:cNvPr>
-          <p:cNvSpPr txBox="1"/>
-          <p:nvPr/>
-        </p:nvSpPr>
-        <p:spPr>
-          <a:xfrm>
-            <a:off x="10499605" y="5898850"/>
-            <a:ext cx="1132936" cy="369332"/>
-          </a:xfrm>
-          <a:prstGeom prst="rect">
-            <a:avLst/>
-          </a:prstGeom>
-          <a:noFill/>
-        </p:spPr>
-        <p:txBody>
-          <a:bodyPr rot="0" spcFirstLastPara="0" vertOverflow="overflow" horzOverflow="overflow" vert="horz" wrap="square" lIns="91440" tIns="45720" rIns="91440" bIns="45720" numCol="1" spcCol="0" rtlCol="0" fromWordArt="0" anchor="t" anchorCtr="0" forceAA="0" compatLnSpc="1">
-            <a:prstTxWarp prst="textNoShape">
-              <a:avLst/>
-            </a:prstTxWarp>
-            <a:spAutoFit/>
-          </a:bodyPr>
-          <a:lstStyle/>
-          <a:p>
-            <a:r>
-              <a:rPr lang="en-US" b="1" dirty="0"/>
-              <a:t>Jumpers</a:t>
-            </a:r>
-            <a:endParaRPr lang="en-US" b="1" dirty="0">
+          <a:p>
+            <a:r>
+              <a:rPr lang="en-US" dirty="0">
+                <a:cs typeface="Calibri"/>
+              </a:rPr>
+              <a:t>IR Receiver sensor</a:t>
+            </a:r>
+          </a:p>
+          <a:p>
+            <a:r>
+              <a:rPr lang="en-US" dirty="0">
+                <a:cs typeface="Calibri"/>
+              </a:rPr>
+              <a:t>Jumpers and connecting wires</a:t>
+            </a:r>
+          </a:p>
+          <a:p>
+            <a:r>
+              <a:rPr lang="en-US">
+                <a:cs typeface="Calibri"/>
+              </a:rPr>
+              <a:t>LED</a:t>
+            </a:r>
+          </a:p>
+          <a:p>
+            <a:r>
+              <a:rPr lang="en-US" dirty="0">
+                <a:cs typeface="Calibri"/>
+              </a:rPr>
+              <a:t>Breadboard (for prototyping)</a:t>
+            </a:r>
+          </a:p>
+          <a:p>
+            <a:r>
+              <a:rPr lang="en-US">
+                <a:cs typeface="Calibri"/>
+              </a:rPr>
+              <a:t>Resistor</a:t>
+            </a:r>
+            <a:endParaRPr lang="en-US" dirty="0">
               <a:cs typeface="Calibri"/>
             </a:endParaRPr>
           </a:p>
@@ -3906,7 +3702,7 @@
     </p:spTree>
     <p:extLst>
       <p:ext uri="{BB962C8B-B14F-4D97-AF65-F5344CB8AC3E}">
-        <p14:creationId xmlns:p14="http://schemas.microsoft.com/office/powerpoint/2010/main" val="2875481910"/>
+        <p14:creationId xmlns:p14="http://schemas.microsoft.com/office/powerpoint/2010/main" val="776806907"/>
       </p:ext>
     </p:extLst>
   </p:cSld>
@@ -3945,135 +3741,598 @@
           <a:chExt cx="0" cy="0"/>
         </a:xfrm>
       </p:grpSpPr>
-      <p:sp>
-        <p:nvSpPr>
-          <p:cNvPr id="2" name="Title 1">
+      <p:pic>
+        <p:nvPicPr>
+          <p:cNvPr id="4" name="Picture 4" descr="A picture containing wrench, device&#10;&#10;Description automatically generated">
             <a:extLst>
               <a:ext uri="{FF2B5EF4-FFF2-40B4-BE49-F238E27FC236}">
-                <a16:creationId xmlns:a16="http://schemas.microsoft.com/office/drawing/2014/main" id="{4430A82F-C774-406F-9402-6BC52C7AABF8}"/>
+                <a16:creationId xmlns:a16="http://schemas.microsoft.com/office/drawing/2014/main" id="{2490B114-576E-4681-B3A7-A6C5E5513BEA}"/>
               </a:ext>
             </a:extLst>
           </p:cNvPr>
-          <p:cNvSpPr>
-            <a:spLocks noGrp="1"/>
-          </p:cNvSpPr>
-          <p:nvPr>
-            <p:ph type="title"/>
-          </p:nvPr>
-        </p:nvSpPr>
-        <p:spPr>
-          <a:xfrm>
-            <a:off x="838200" y="1401647"/>
-            <a:ext cx="10515600" cy="750469"/>
-          </a:xfrm>
-        </p:spPr>
-        <p:txBody>
-          <a:bodyPr/>
-          <a:lstStyle/>
-          <a:p>
-            <a:pPr algn="ctr"/>
-            <a:r>
-              <a:rPr lang="en-US" b="1" dirty="0">
-                <a:cs typeface="Calibri Light"/>
-              </a:rPr>
-              <a:t>Working Principle of a Relay</a:t>
-            </a:r>
-          </a:p>
-        </p:txBody>
-      </p:sp>
-      <p:sp>
-        <p:nvSpPr>
-          <p:cNvPr id="3" name="Content Placeholder 2">
+          <p:cNvPicPr>
+            <a:picLocks noChangeAspect="1"/>
+          </p:cNvPicPr>
+          <p:nvPr/>
+        </p:nvPicPr>
+        <p:blipFill>
+          <a:blip r:embed="rId2"/>
+          <a:stretch>
+            <a:fillRect/>
+          </a:stretch>
+        </p:blipFill>
+        <p:spPr>
+          <a:xfrm>
+            <a:off x="66136" y="1393489"/>
+            <a:ext cx="2455653" cy="2043815"/>
+          </a:xfrm>
+          <a:prstGeom prst="rect">
+            <a:avLst/>
+          </a:prstGeom>
+        </p:spPr>
+      </p:pic>
+      <p:pic>
+        <p:nvPicPr>
+          <p:cNvPr id="5" name="Picture 5">
             <a:extLst>
               <a:ext uri="{FF2B5EF4-FFF2-40B4-BE49-F238E27FC236}">
-                <a16:creationId xmlns:a16="http://schemas.microsoft.com/office/drawing/2014/main" id="{DD359D6D-3433-42F4-B18C-9D9A0441F868}"/>
+                <a16:creationId xmlns:a16="http://schemas.microsoft.com/office/drawing/2014/main" id="{43C24F79-0A22-4DDB-8A2B-8A89B88ACEA9}"/>
               </a:ext>
             </a:extLst>
           </p:cNvPr>
-          <p:cNvSpPr>
-            <a:spLocks noGrp="1"/>
-          </p:cNvSpPr>
-          <p:nvPr>
-            <p:ph idx="1"/>
-          </p:nvPr>
-        </p:nvSpPr>
-        <p:spPr>
-          <a:xfrm>
-            <a:off x="838200" y="2295829"/>
-            <a:ext cx="10515600" cy="3881133"/>
-          </a:xfrm>
-        </p:spPr>
-        <p:txBody>
-          <a:bodyPr vert="horz" lIns="91440" tIns="45720" rIns="91440" bIns="45720" rtlCol="0" anchor="t">
-            <a:normAutofit/>
+          <p:cNvPicPr>
+            <a:picLocks noChangeAspect="1"/>
+          </p:cNvPicPr>
+          <p:nvPr/>
+        </p:nvPicPr>
+        <p:blipFill>
+          <a:blip r:embed="rId3"/>
+          <a:stretch>
+            <a:fillRect/>
+          </a:stretch>
+        </p:blipFill>
+        <p:spPr>
+          <a:xfrm>
+            <a:off x="3344174" y="1623924"/>
+            <a:ext cx="2484408" cy="1928004"/>
+          </a:xfrm>
+          <a:prstGeom prst="rect">
+            <a:avLst/>
+          </a:prstGeom>
+        </p:spPr>
+      </p:pic>
+      <p:pic>
+        <p:nvPicPr>
+          <p:cNvPr id="8" name="Picture 8">
+            <a:extLst>
+              <a:ext uri="{FF2B5EF4-FFF2-40B4-BE49-F238E27FC236}">
+                <a16:creationId xmlns:a16="http://schemas.microsoft.com/office/drawing/2014/main" id="{9DAD5E48-9F22-4BAE-A671-2954CFA6C5C5}"/>
+              </a:ext>
+            </a:extLst>
+          </p:cNvPr>
+          <p:cNvPicPr>
+            <a:picLocks noChangeAspect="1"/>
+          </p:cNvPicPr>
+          <p:nvPr/>
+        </p:nvPicPr>
+        <p:blipFill>
+          <a:blip r:embed="rId4"/>
+          <a:stretch>
+            <a:fillRect/>
+          </a:stretch>
+        </p:blipFill>
+        <p:spPr>
+          <a:xfrm>
+            <a:off x="3602967" y="4417336"/>
+            <a:ext cx="2024333" cy="1833330"/>
+          </a:xfrm>
+          <a:prstGeom prst="rect">
+            <a:avLst/>
+          </a:prstGeom>
+        </p:spPr>
+      </p:pic>
+      <p:pic>
+        <p:nvPicPr>
+          <p:cNvPr id="9" name="Picture 9" descr="A picture containing kite, sky, flying, colorful&#10;&#10;Description automatically generated">
+            <a:extLst>
+              <a:ext uri="{FF2B5EF4-FFF2-40B4-BE49-F238E27FC236}">
+                <a16:creationId xmlns:a16="http://schemas.microsoft.com/office/drawing/2014/main" id="{DFEEFB1C-C76B-4A69-9D79-E2D3CDCA199E}"/>
+              </a:ext>
+            </a:extLst>
+          </p:cNvPr>
+          <p:cNvPicPr>
+            <a:picLocks noChangeAspect="1"/>
+          </p:cNvPicPr>
+          <p:nvPr/>
+        </p:nvPicPr>
+        <p:blipFill>
+          <a:blip r:embed="rId5"/>
+          <a:stretch>
+            <a:fillRect/>
+          </a:stretch>
+        </p:blipFill>
+        <p:spPr>
+          <a:xfrm>
+            <a:off x="6047115" y="4136210"/>
+            <a:ext cx="2412521" cy="2266182"/>
+          </a:xfrm>
+          <a:prstGeom prst="rect">
+            <a:avLst/>
+          </a:prstGeom>
+        </p:spPr>
+      </p:pic>
+      <p:sp>
+        <p:nvSpPr>
+          <p:cNvPr id="10" name="TextBox 9">
+            <a:extLst>
+              <a:ext uri="{FF2B5EF4-FFF2-40B4-BE49-F238E27FC236}">
+                <a16:creationId xmlns:a16="http://schemas.microsoft.com/office/drawing/2014/main" id="{C472B63B-5548-49C8-8D59-F12651338BD2}"/>
+              </a:ext>
+            </a:extLst>
+          </p:cNvPr>
+          <p:cNvSpPr txBox="1"/>
+          <p:nvPr/>
+        </p:nvSpPr>
+        <p:spPr>
+          <a:xfrm>
+            <a:off x="1115683" y="2682816"/>
+            <a:ext cx="1938068" cy="369332"/>
+          </a:xfrm>
+          <a:prstGeom prst="rect">
+            <a:avLst/>
+          </a:prstGeom>
+          <a:noFill/>
+        </p:spPr>
+        <p:txBody>
+          <a:bodyPr rot="0" spcFirstLastPara="0" vertOverflow="overflow" horzOverflow="overflow" vert="horz" wrap="square" lIns="91440" tIns="45720" rIns="91440" bIns="45720" numCol="1" spcCol="0" rtlCol="0" fromWordArt="0" anchor="t" anchorCtr="0" forceAA="0" compatLnSpc="1">
+            <a:prstTxWarp prst="textNoShape">
+              <a:avLst/>
+            </a:prstTxWarp>
+            <a:spAutoFit/>
           </a:bodyPr>
           <a:lstStyle/>
           <a:p>
             <a:r>
-              <a:rPr lang="en-US" dirty="0">
-                <a:cs typeface="Calibri"/>
-              </a:rPr>
-              <a:t>It works on the principle of an electromagnetic attraction.</a:t>
-            </a:r>
-          </a:p>
-          <a:p>
-            <a:r>
-              <a:rPr lang="en-US" dirty="0">
-                <a:cs typeface="Calibri"/>
-              </a:rPr>
-              <a:t>When the circuit of the relay senses the fault current, it </a:t>
-            </a:r>
-            <a:r>
-              <a:rPr lang="en-US">
-                <a:cs typeface="Calibri"/>
-              </a:rPr>
-              <a:t>energizes</a:t>
-            </a:r>
-            <a:r>
-              <a:rPr lang="en-US" dirty="0">
-                <a:cs typeface="Calibri"/>
-              </a:rPr>
-              <a:t> </a:t>
-            </a:r>
-            <a:r>
-              <a:rPr lang="en-US">
-                <a:cs typeface="Calibri"/>
-              </a:rPr>
-              <a:t>the</a:t>
-            </a:r>
-            <a:r>
-              <a:rPr lang="en-US" dirty="0">
-                <a:cs typeface="Calibri"/>
-              </a:rPr>
-              <a:t> electromagnetic field which produces the temporary magnetic field.</a:t>
-            </a:r>
-          </a:p>
-          <a:p>
-            <a:r>
-              <a:rPr lang="en-US" dirty="0">
-                <a:cs typeface="Calibri"/>
-              </a:rPr>
-              <a:t>This magnetic field moves the relay </a:t>
-            </a:r>
-            <a:r>
-              <a:rPr lang="en-US">
-                <a:cs typeface="Calibri"/>
-              </a:rPr>
-              <a:t>armature</a:t>
-            </a:r>
-            <a:r>
-              <a:rPr lang="en-US" dirty="0">
-                <a:cs typeface="Calibri"/>
-              </a:rPr>
-              <a:t> for opening of closing the connection.</a:t>
-            </a:r>
+              <a:rPr lang="en-US" b="1" dirty="0"/>
+              <a:t>IR Receiver sensor</a:t>
+            </a:r>
+            <a:endParaRPr lang="en-US" b="1" dirty="0">
+              <a:cs typeface="Calibri"/>
+            </a:endParaRPr>
+          </a:p>
+        </p:txBody>
+      </p:sp>
+      <p:sp>
+        <p:nvSpPr>
+          <p:cNvPr id="11" name="TextBox 10">
+            <a:extLst>
+              <a:ext uri="{FF2B5EF4-FFF2-40B4-BE49-F238E27FC236}">
+                <a16:creationId xmlns:a16="http://schemas.microsoft.com/office/drawing/2014/main" id="{0938B96B-8278-4048-B18C-4F13B1DE0279}"/>
+              </a:ext>
+            </a:extLst>
+          </p:cNvPr>
+          <p:cNvSpPr txBox="1"/>
+          <p:nvPr/>
+        </p:nvSpPr>
+        <p:spPr>
+          <a:xfrm>
+            <a:off x="3602067" y="3429539"/>
+            <a:ext cx="2383767" cy="369332"/>
+          </a:xfrm>
+          <a:prstGeom prst="rect">
+            <a:avLst/>
+          </a:prstGeom>
+          <a:noFill/>
+        </p:spPr>
+        <p:txBody>
+          <a:bodyPr rot="0" spcFirstLastPara="0" vertOverflow="overflow" horzOverflow="overflow" vert="horz" wrap="square" lIns="91440" tIns="45720" rIns="91440" bIns="45720" numCol="1" spcCol="0" rtlCol="0" fromWordArt="0" anchor="t" anchorCtr="0" forceAA="0" compatLnSpc="1">
+            <a:prstTxWarp prst="textNoShape">
+              <a:avLst/>
+            </a:prstTxWarp>
+            <a:spAutoFit/>
+          </a:bodyPr>
+          <a:lstStyle/>
+          <a:p>
+            <a:r>
+              <a:rPr lang="en-US" b="1" dirty="0"/>
+              <a:t>Arduino UNO R3 board</a:t>
+            </a:r>
+            <a:endParaRPr lang="en-US" b="1" dirty="0">
+              <a:cs typeface="Calibri"/>
+            </a:endParaRPr>
+          </a:p>
+        </p:txBody>
+      </p:sp>
+      <p:sp>
+        <p:nvSpPr>
+          <p:cNvPr id="14" name="TextBox 13">
+            <a:extLst>
+              <a:ext uri="{FF2B5EF4-FFF2-40B4-BE49-F238E27FC236}">
+                <a16:creationId xmlns:a16="http://schemas.microsoft.com/office/drawing/2014/main" id="{FF1DA02B-8CED-4EA3-A704-85810007D8B6}"/>
+              </a:ext>
+            </a:extLst>
+          </p:cNvPr>
+          <p:cNvSpPr txBox="1"/>
+          <p:nvPr/>
+        </p:nvSpPr>
+        <p:spPr>
+          <a:xfrm>
+            <a:off x="3728768" y="6201674"/>
+            <a:ext cx="1708031" cy="369332"/>
+          </a:xfrm>
+          <a:prstGeom prst="rect">
+            <a:avLst/>
+          </a:prstGeom>
+          <a:noFill/>
+        </p:spPr>
+        <p:txBody>
+          <a:bodyPr rot="0" spcFirstLastPara="0" vertOverflow="overflow" horzOverflow="overflow" vert="horz" wrap="square" lIns="91440" tIns="45720" rIns="91440" bIns="45720" numCol="1" spcCol="0" rtlCol="0" fromWordArt="0" anchor="t" anchorCtr="0" forceAA="0" compatLnSpc="1">
+            <a:prstTxWarp prst="textNoShape">
+              <a:avLst/>
+            </a:prstTxWarp>
+            <a:spAutoFit/>
+          </a:bodyPr>
+          <a:lstStyle/>
+          <a:p>
+            <a:pPr algn="l"/>
+            <a:r>
+              <a:rPr lang="en-US" b="1" dirty="0"/>
+              <a:t>Breadboard</a:t>
+            </a:r>
+            <a:endParaRPr lang="en-US" b="1" dirty="0">
+              <a:cs typeface="Calibri"/>
+            </a:endParaRPr>
+          </a:p>
+        </p:txBody>
+      </p:sp>
+      <p:sp>
+        <p:nvSpPr>
+          <p:cNvPr id="15" name="TextBox 14">
+            <a:extLst>
+              <a:ext uri="{FF2B5EF4-FFF2-40B4-BE49-F238E27FC236}">
+                <a16:creationId xmlns:a16="http://schemas.microsoft.com/office/drawing/2014/main" id="{9710169D-6056-442E-AE7F-22A7D234EFAF}"/>
+              </a:ext>
+            </a:extLst>
+          </p:cNvPr>
+          <p:cNvSpPr txBox="1"/>
+          <p:nvPr/>
+        </p:nvSpPr>
+        <p:spPr>
+          <a:xfrm>
+            <a:off x="7796662" y="5740699"/>
+            <a:ext cx="1132936" cy="369332"/>
+          </a:xfrm>
+          <a:prstGeom prst="rect">
+            <a:avLst/>
+          </a:prstGeom>
+          <a:noFill/>
+        </p:spPr>
+        <p:txBody>
+          <a:bodyPr rot="0" spcFirstLastPara="0" vertOverflow="overflow" horzOverflow="overflow" vert="horz" wrap="square" lIns="91440" tIns="45720" rIns="91440" bIns="45720" numCol="1" spcCol="0" rtlCol="0" fromWordArt="0" anchor="t" anchorCtr="0" forceAA="0" compatLnSpc="1">
+            <a:prstTxWarp prst="textNoShape">
+              <a:avLst/>
+            </a:prstTxWarp>
+            <a:spAutoFit/>
+          </a:bodyPr>
+          <a:lstStyle/>
+          <a:p>
+            <a:r>
+              <a:rPr lang="en-US" b="1" dirty="0"/>
+              <a:t>Jumpers</a:t>
+            </a:r>
+            <a:endParaRPr lang="en-US" b="1" dirty="0">
+              <a:cs typeface="Calibri"/>
+            </a:endParaRPr>
+          </a:p>
+        </p:txBody>
+      </p:sp>
+      <p:pic>
+        <p:nvPicPr>
+          <p:cNvPr id="2" name="Picture 2">
+            <a:extLst>
+              <a:ext uri="{FF2B5EF4-FFF2-40B4-BE49-F238E27FC236}">
+                <a16:creationId xmlns:a16="http://schemas.microsoft.com/office/drawing/2014/main" id="{5722DAB3-20D0-4FC1-BA9D-F2BC576596A3}"/>
+              </a:ext>
+            </a:extLst>
+          </p:cNvPr>
+          <p:cNvPicPr>
+            <a:picLocks noChangeAspect="1"/>
+          </p:cNvPicPr>
+          <p:nvPr/>
+        </p:nvPicPr>
+        <p:blipFill>
+          <a:blip r:embed="rId6"/>
+          <a:stretch>
+            <a:fillRect/>
+          </a:stretch>
+        </p:blipFill>
+        <p:spPr>
+          <a:xfrm>
+            <a:off x="206944" y="4780112"/>
+            <a:ext cx="1800225" cy="1409700"/>
+          </a:xfrm>
+          <a:prstGeom prst="rect">
+            <a:avLst/>
+          </a:prstGeom>
+        </p:spPr>
+      </p:pic>
+      <p:sp>
+        <p:nvSpPr>
+          <p:cNvPr id="16" name="TextBox 1">
+            <a:extLst>
+              <a:ext uri="{FF2B5EF4-FFF2-40B4-BE49-F238E27FC236}">
+                <a16:creationId xmlns:a16="http://schemas.microsoft.com/office/drawing/2014/main" id="{473E4C2E-986E-416B-BC0D-C92A6D09FA25}"/>
+              </a:ext>
+            </a:extLst>
+          </p:cNvPr>
+          <p:cNvSpPr txBox="1"/>
+          <p:nvPr/>
+        </p:nvSpPr>
+        <p:spPr>
+          <a:xfrm>
+            <a:off x="1027622" y="5786528"/>
+            <a:ext cx="2110597" cy="646331"/>
+          </a:xfrm>
+          <a:prstGeom prst="rect">
+            <a:avLst/>
+          </a:prstGeom>
+          <a:noFill/>
+        </p:spPr>
+        <p:txBody>
+          <a:bodyPr rot="0" spcFirstLastPara="0" vert="horz" wrap="square" lIns="91440" tIns="45720" rIns="91440" bIns="45720" numCol="1" spcCol="0" rtlCol="0" fromWordArt="0" anchor="t" anchorCtr="0" forceAA="0" compatLnSpc="1">
+            <a:prstTxWarp prst="textNoShape">
+              <a:avLst/>
+            </a:prstTxWarp>
+            <a:spAutoFit/>
+          </a:bodyPr>
+          <a:lstStyle>
+            <a:defPPr>
+              <a:defRPr lang="en-US"/>
+            </a:defPPr>
+            <a:lvl1pPr marL="0" algn="l" defTabSz="914400" rtl="0" eaLnBrk="1" latinLnBrk="0" hangingPunct="1">
+              <a:defRPr sz="1800" kern="1200">
+                <a:solidFill>
+                  <a:schemeClr val="tx1"/>
+                </a:solidFill>
+                <a:latin typeface="+mn-lt"/>
+                <a:ea typeface="+mn-ea"/>
+                <a:cs typeface="+mn-cs"/>
+              </a:defRPr>
+            </a:lvl1pPr>
+            <a:lvl2pPr marL="457200" algn="l" defTabSz="914400" rtl="0" eaLnBrk="1" latinLnBrk="0" hangingPunct="1">
+              <a:defRPr sz="1800" kern="1200">
+                <a:solidFill>
+                  <a:schemeClr val="tx1"/>
+                </a:solidFill>
+                <a:latin typeface="+mn-lt"/>
+                <a:ea typeface="+mn-ea"/>
+                <a:cs typeface="+mn-cs"/>
+              </a:defRPr>
+            </a:lvl2pPr>
+            <a:lvl3pPr marL="914400" algn="l" defTabSz="914400" rtl="0" eaLnBrk="1" latinLnBrk="0" hangingPunct="1">
+              <a:defRPr sz="1800" kern="1200">
+                <a:solidFill>
+                  <a:schemeClr val="tx1"/>
+                </a:solidFill>
+                <a:latin typeface="+mn-lt"/>
+                <a:ea typeface="+mn-ea"/>
+                <a:cs typeface="+mn-cs"/>
+              </a:defRPr>
+            </a:lvl3pPr>
+            <a:lvl4pPr marL="1371600" algn="l" defTabSz="914400" rtl="0" eaLnBrk="1" latinLnBrk="0" hangingPunct="1">
+              <a:defRPr sz="1800" kern="1200">
+                <a:solidFill>
+                  <a:schemeClr val="tx1"/>
+                </a:solidFill>
+                <a:latin typeface="+mn-lt"/>
+                <a:ea typeface="+mn-ea"/>
+                <a:cs typeface="+mn-cs"/>
+              </a:defRPr>
+            </a:lvl4pPr>
+            <a:lvl5pPr marL="1828800" algn="l" defTabSz="914400" rtl="0" eaLnBrk="1" latinLnBrk="0" hangingPunct="1">
+              <a:defRPr sz="1800" kern="1200">
+                <a:solidFill>
+                  <a:schemeClr val="tx1"/>
+                </a:solidFill>
+                <a:latin typeface="+mn-lt"/>
+                <a:ea typeface="+mn-ea"/>
+                <a:cs typeface="+mn-cs"/>
+              </a:defRPr>
+            </a:lvl5pPr>
+            <a:lvl6pPr marL="2286000" algn="l" defTabSz="914400" rtl="0" eaLnBrk="1" latinLnBrk="0" hangingPunct="1">
+              <a:defRPr sz="1800" kern="1200">
+                <a:solidFill>
+                  <a:schemeClr val="tx1"/>
+                </a:solidFill>
+                <a:latin typeface="+mn-lt"/>
+                <a:ea typeface="+mn-ea"/>
+                <a:cs typeface="+mn-cs"/>
+              </a:defRPr>
+            </a:lvl6pPr>
+            <a:lvl7pPr marL="2743200" algn="l" defTabSz="914400" rtl="0" eaLnBrk="1" latinLnBrk="0" hangingPunct="1">
+              <a:defRPr sz="1800" kern="1200">
+                <a:solidFill>
+                  <a:schemeClr val="tx1"/>
+                </a:solidFill>
+                <a:latin typeface="+mn-lt"/>
+                <a:ea typeface="+mn-ea"/>
+                <a:cs typeface="+mn-cs"/>
+              </a:defRPr>
+            </a:lvl7pPr>
+            <a:lvl8pPr marL="3200400" algn="l" defTabSz="914400" rtl="0" eaLnBrk="1" latinLnBrk="0" hangingPunct="1">
+              <a:defRPr sz="1800" kern="1200">
+                <a:solidFill>
+                  <a:schemeClr val="tx1"/>
+                </a:solidFill>
+                <a:latin typeface="+mn-lt"/>
+                <a:ea typeface="+mn-ea"/>
+                <a:cs typeface="+mn-cs"/>
+              </a:defRPr>
+            </a:lvl8pPr>
+            <a:lvl9pPr marL="3657600" algn="l" defTabSz="914400" rtl="0" eaLnBrk="1" latinLnBrk="0" hangingPunct="1">
+              <a:defRPr sz="1800" kern="1200">
+                <a:solidFill>
+                  <a:schemeClr val="tx1"/>
+                </a:solidFill>
+                <a:latin typeface="+mn-lt"/>
+                <a:ea typeface="+mn-ea"/>
+                <a:cs typeface="+mn-cs"/>
+              </a:defRPr>
+            </a:lvl9pPr>
+          </a:lstStyle>
+          <a:p>
+            <a:r>
+              <a:rPr lang="en-US" b="1"/>
+              <a:t>Light Emitting Diode (LED)</a:t>
+            </a:r>
+            <a:endParaRPr lang="en-US" b="1">
+              <a:cs typeface="Calibri"/>
+            </a:endParaRPr>
+          </a:p>
+        </p:txBody>
+      </p:sp>
+      <p:pic>
+        <p:nvPicPr>
+          <p:cNvPr id="3" name="Picture 16">
+            <a:extLst>
+              <a:ext uri="{FF2B5EF4-FFF2-40B4-BE49-F238E27FC236}">
+                <a16:creationId xmlns:a16="http://schemas.microsoft.com/office/drawing/2014/main" id="{D3CA2093-DE61-4B6E-BE9A-B639EEE481B5}"/>
+              </a:ext>
+            </a:extLst>
+          </p:cNvPr>
+          <p:cNvPicPr>
+            <a:picLocks noChangeAspect="1"/>
+          </p:cNvPicPr>
+          <p:nvPr/>
+        </p:nvPicPr>
+        <p:blipFill>
+          <a:blip r:embed="rId7"/>
+          <a:stretch>
+            <a:fillRect/>
+          </a:stretch>
+        </p:blipFill>
+        <p:spPr>
+          <a:xfrm>
+            <a:off x="6469002" y="1626529"/>
+            <a:ext cx="1266825" cy="1362075"/>
+          </a:xfrm>
+          <a:prstGeom prst="rect">
+            <a:avLst/>
+          </a:prstGeom>
+        </p:spPr>
+      </p:pic>
+      <p:sp>
+        <p:nvSpPr>
+          <p:cNvPr id="17" name="TextBox 16">
+            <a:extLst>
+              <a:ext uri="{FF2B5EF4-FFF2-40B4-BE49-F238E27FC236}">
+                <a16:creationId xmlns:a16="http://schemas.microsoft.com/office/drawing/2014/main" id="{779B615E-E50F-4AC7-9121-795EC71A7C21}"/>
+              </a:ext>
+            </a:extLst>
+          </p:cNvPr>
+          <p:cNvSpPr txBox="1"/>
+          <p:nvPr/>
+        </p:nvSpPr>
+        <p:spPr>
+          <a:xfrm>
+            <a:off x="6579079" y="2639683"/>
+            <a:ext cx="1521125" cy="369332"/>
+          </a:xfrm>
+          <a:prstGeom prst="rect">
+            <a:avLst/>
+          </a:prstGeom>
+          <a:noFill/>
+        </p:spPr>
+        <p:txBody>
+          <a:bodyPr rot="0" spcFirstLastPara="0" vertOverflow="overflow" horzOverflow="overflow" vert="horz" wrap="square" lIns="91440" tIns="45720" rIns="91440" bIns="45720" numCol="1" spcCol="0" rtlCol="0" fromWordArt="0" anchor="t" anchorCtr="0" forceAA="0" compatLnSpc="1">
+            <a:prstTxWarp prst="textNoShape">
+              <a:avLst/>
+            </a:prstTxWarp>
+            <a:spAutoFit/>
+          </a:bodyPr>
+          <a:lstStyle/>
+          <a:p>
+            <a:r>
+              <a:rPr lang="en-US" b="1"/>
+              <a:t>220 ohms</a:t>
+            </a:r>
+            <a:endParaRPr lang="en-US"/>
+          </a:p>
+        </p:txBody>
+      </p:sp>
+      <p:pic>
+        <p:nvPicPr>
+          <p:cNvPr id="18" name="Picture 18">
+            <a:extLst>
+              <a:ext uri="{FF2B5EF4-FFF2-40B4-BE49-F238E27FC236}">
+                <a16:creationId xmlns:a16="http://schemas.microsoft.com/office/drawing/2014/main" id="{2C5C11F3-3F45-46AE-97F8-D74D8DC89D97}"/>
+              </a:ext>
+            </a:extLst>
+          </p:cNvPr>
+          <p:cNvPicPr>
+            <a:picLocks noChangeAspect="1"/>
+          </p:cNvPicPr>
+          <p:nvPr/>
+        </p:nvPicPr>
+        <p:blipFill>
+          <a:blip r:embed="rId8"/>
+          <a:stretch>
+            <a:fillRect/>
+          </a:stretch>
+        </p:blipFill>
+        <p:spPr>
+          <a:xfrm>
+            <a:off x="8706928" y="1710007"/>
+            <a:ext cx="2743200" cy="3136061"/>
+          </a:xfrm>
+          <a:prstGeom prst="rect">
+            <a:avLst/>
+          </a:prstGeom>
+        </p:spPr>
+      </p:pic>
+      <p:sp>
+        <p:nvSpPr>
+          <p:cNvPr id="19" name="TextBox 18">
+            <a:extLst>
+              <a:ext uri="{FF2B5EF4-FFF2-40B4-BE49-F238E27FC236}">
+                <a16:creationId xmlns:a16="http://schemas.microsoft.com/office/drawing/2014/main" id="{9DBC2719-5508-421E-B785-080920C1A6BA}"/>
+              </a:ext>
+            </a:extLst>
+          </p:cNvPr>
+          <p:cNvSpPr txBox="1"/>
+          <p:nvPr/>
+        </p:nvSpPr>
+        <p:spPr>
+          <a:xfrm>
+            <a:off x="9109494" y="4839419"/>
+            <a:ext cx="2743200" cy="369332"/>
+          </a:xfrm>
+          <a:prstGeom prst="rect">
+            <a:avLst/>
+          </a:prstGeom>
+          <a:noFill/>
+        </p:spPr>
+        <p:txBody>
+          <a:bodyPr rot="0" spcFirstLastPara="0" vertOverflow="overflow" horzOverflow="overflow" vert="horz" wrap="square" lIns="91440" tIns="45720" rIns="91440" bIns="45720" numCol="1" spcCol="0" rtlCol="0" fromWordArt="0" anchor="t" anchorCtr="0" forceAA="0" compatLnSpc="1">
+            <a:prstTxWarp prst="textNoShape">
+              <a:avLst/>
+            </a:prstTxWarp>
+            <a:spAutoFit/>
+          </a:bodyPr>
+          <a:lstStyle/>
+          <a:p>
+            <a:r>
+              <a:rPr lang="en-US" b="1"/>
+              <a:t>IR Remote</a:t>
+            </a:r>
+            <a:endParaRPr lang="en-US"/>
           </a:p>
         </p:txBody>
       </p:sp>
     </p:spTree>
     <p:extLst>
       <p:ext uri="{BB962C8B-B14F-4D97-AF65-F5344CB8AC3E}">
-        <p14:creationId xmlns:p14="http://schemas.microsoft.com/office/powerpoint/2010/main" val="3227370275"/>
+        <p14:creationId xmlns:p14="http://schemas.microsoft.com/office/powerpoint/2010/main" val="2875481910"/>
       </p:ext>
     </p:extLst>
   </p:cSld>
@@ -4112,40 +4371,133 @@
           <a:chExt cx="0" cy="0"/>
         </a:xfrm>
       </p:grpSpPr>
-      <p:pic>
-        <p:nvPicPr>
-          <p:cNvPr id="4" name="Picture 4" descr="Diagram, schematic&#10;&#10;Description automatically generated">
+      <p:sp>
+        <p:nvSpPr>
+          <p:cNvPr id="2" name="Title 1">
             <a:extLst>
               <a:ext uri="{FF2B5EF4-FFF2-40B4-BE49-F238E27FC236}">
-                <a16:creationId xmlns:a16="http://schemas.microsoft.com/office/drawing/2014/main" id="{D98F92DA-0927-443D-8964-EE9542F4475C}"/>
+                <a16:creationId xmlns:a16="http://schemas.microsoft.com/office/drawing/2014/main" id="{4213BC6D-1460-4897-8B8B-69AFA038B123}"/>
               </a:ext>
             </a:extLst>
           </p:cNvPr>
-          <p:cNvPicPr>
-            <a:picLocks noChangeAspect="1"/>
-          </p:cNvPicPr>
-          <p:nvPr/>
-        </p:nvPicPr>
-        <p:blipFill>
-          <a:blip r:embed="rId2"/>
-          <a:stretch>
-            <a:fillRect/>
-          </a:stretch>
-        </p:blipFill>
-        <p:spPr>
-          <a:xfrm>
-            <a:off x="2711570" y="1719935"/>
-            <a:ext cx="6768859" cy="4597073"/>
-          </a:xfrm>
-          <a:prstGeom prst="rect">
-            <a:avLst/>
-          </a:prstGeom>
-        </p:spPr>
-      </p:pic>
+          <p:cNvSpPr>
+            <a:spLocks noGrp="1"/>
+          </p:cNvSpPr>
+          <p:nvPr>
+            <p:ph type="title"/>
+          </p:nvPr>
+        </p:nvSpPr>
+        <p:spPr>
+          <a:xfrm>
+            <a:off x="838200" y="1401647"/>
+            <a:ext cx="10515600" cy="1153035"/>
+          </a:xfrm>
+        </p:spPr>
+        <p:txBody>
+          <a:bodyPr/>
+          <a:lstStyle/>
+          <a:p>
+            <a:pPr algn="ctr"/>
+            <a:r>
+              <a:rPr lang="en-US" b="1" dirty="0">
+                <a:cs typeface="Calibri Light"/>
+              </a:rPr>
+              <a:t>Working Principle of IR Receiver Sensor</a:t>
+            </a:r>
+          </a:p>
+        </p:txBody>
+      </p:sp>
+      <p:sp>
+        <p:nvSpPr>
+          <p:cNvPr id="3" name="Content Placeholder 2">
+            <a:extLst>
+              <a:ext uri="{FF2B5EF4-FFF2-40B4-BE49-F238E27FC236}">
+                <a16:creationId xmlns:a16="http://schemas.microsoft.com/office/drawing/2014/main" id="{23A39E61-5753-452A-AC01-05F3AD76CFBB}"/>
+              </a:ext>
+            </a:extLst>
+          </p:cNvPr>
+          <p:cNvSpPr>
+            <a:spLocks noGrp="1"/>
+          </p:cNvSpPr>
+          <p:nvPr>
+            <p:ph idx="1"/>
+          </p:nvPr>
+        </p:nvSpPr>
+        <p:spPr>
+          <a:xfrm>
+            <a:off x="838200" y="2382093"/>
+            <a:ext cx="10515600" cy="4226189"/>
+          </a:xfrm>
+        </p:spPr>
+        <p:txBody>
+          <a:bodyPr vert="horz" lIns="91440" tIns="45720" rIns="91440" bIns="45720" rtlCol="0" anchor="t">
+            <a:normAutofit lnSpcReduction="10000"/>
+          </a:bodyPr>
+          <a:lstStyle/>
+          <a:p>
+            <a:r>
+              <a:rPr lang="en-US" dirty="0">
+                <a:cs typeface="Calibri"/>
+              </a:rPr>
+              <a:t>IR Receiver is also called a photodiode.</a:t>
+            </a:r>
+          </a:p>
+          <a:p>
+            <a:r>
+              <a:rPr lang="en-US" dirty="0">
+                <a:cs typeface="Calibri"/>
+              </a:rPr>
+              <a:t>The emitter is an IR LED and the detector is an IR photodiode.</a:t>
+            </a:r>
+          </a:p>
+          <a:p>
+            <a:r>
+              <a:rPr lang="en-US" dirty="0">
+                <a:cs typeface="Calibri"/>
+              </a:rPr>
+              <a:t>The IR photodiode is sensitive to the IR light emitted by an IR LED. The photodiode's resistance and output voltage change in proportion to the IR light received.</a:t>
+            </a:r>
+          </a:p>
+          <a:p>
+            <a:r>
+              <a:rPr lang="en-US">
+                <a:cs typeface="Calibri"/>
+              </a:rPr>
+              <a:t>IR receivers are specially filtered for IR light, they are not good at detecting visible light.</a:t>
+            </a:r>
+            <a:endParaRPr lang="en-US" dirty="0">
+              <a:cs typeface="Calibri"/>
+            </a:endParaRPr>
+          </a:p>
+          <a:p>
+            <a:r>
+              <a:rPr lang="en-US">
+                <a:cs typeface="Calibri"/>
+              </a:rPr>
+              <a:t>They have a demodulator that looks for modulated IR at 38kHz. Just shining an IR LED</a:t>
+            </a:r>
+            <a:r>
+              <a:rPr lang="en-US" dirty="0">
+                <a:cs typeface="Calibri"/>
+              </a:rPr>
+              <a:t> </a:t>
+            </a:r>
+            <a:r>
+              <a:rPr lang="en-US">
+                <a:cs typeface="Calibri"/>
+              </a:rPr>
+              <a:t>won't be detected, it has to be PWM blinking at 38kHZ.</a:t>
+            </a:r>
+            <a:endParaRPr lang="en-US" dirty="0">
+              <a:cs typeface="Calibri"/>
+            </a:endParaRPr>
+          </a:p>
+        </p:txBody>
+      </p:sp>
     </p:spTree>
     <p:extLst>
       <p:ext uri="{BB962C8B-B14F-4D97-AF65-F5344CB8AC3E}">
-        <p14:creationId xmlns:p14="http://schemas.microsoft.com/office/powerpoint/2010/main" val="2995805788"/>
+        <p14:creationId xmlns:p14="http://schemas.microsoft.com/office/powerpoint/2010/main" val="2462514724"/>
       </p:ext>
     </p:extLst>
   </p:cSld>
@@ -4184,91 +4536,72 @@
           <a:chExt cx="0" cy="0"/>
         </a:xfrm>
       </p:grpSpPr>
-      <p:sp>
-        <p:nvSpPr>
-          <p:cNvPr id="2" name="Title 1">
+      <p:pic>
+        <p:nvPicPr>
+          <p:cNvPr id="4" name="Picture 4" descr="Diagram&#10;&#10;Description automatically generated">
             <a:extLst>
               <a:ext uri="{FF2B5EF4-FFF2-40B4-BE49-F238E27FC236}">
-                <a16:creationId xmlns:a16="http://schemas.microsoft.com/office/drawing/2014/main" id="{4213BC6D-1460-4897-8B8B-69AFA038B123}"/>
+                <a16:creationId xmlns:a16="http://schemas.microsoft.com/office/drawing/2014/main" id="{FAFA7A03-238C-43B7-82C5-E0070439BDFE}"/>
               </a:ext>
             </a:extLst>
           </p:cNvPr>
-          <p:cNvSpPr>
-            <a:spLocks noGrp="1"/>
-          </p:cNvSpPr>
-          <p:nvPr>
-            <p:ph type="title"/>
-          </p:nvPr>
-        </p:nvSpPr>
-        <p:spPr>
-          <a:xfrm>
-            <a:off x="838200" y="1401647"/>
-            <a:ext cx="10515600" cy="1153035"/>
-          </a:xfrm>
-        </p:spPr>
-        <p:txBody>
-          <a:bodyPr/>
-          <a:lstStyle/>
-          <a:p>
-            <a:pPr algn="ctr"/>
-            <a:r>
-              <a:rPr lang="en-US" b="1" dirty="0">
-                <a:cs typeface="Calibri Light"/>
-              </a:rPr>
-              <a:t>Working Principle of IR Receiver Sensor</a:t>
-            </a:r>
-          </a:p>
-        </p:txBody>
-      </p:sp>
-      <p:sp>
-        <p:nvSpPr>
-          <p:cNvPr id="3" name="Content Placeholder 2">
+          <p:cNvPicPr>
+            <a:picLocks noChangeAspect="1"/>
+          </p:cNvPicPr>
+          <p:nvPr/>
+        </p:nvPicPr>
+        <p:blipFill>
+          <a:blip r:embed="rId2"/>
+          <a:stretch>
+            <a:fillRect/>
+          </a:stretch>
+        </p:blipFill>
+        <p:spPr>
+          <a:xfrm>
+            <a:off x="2179608" y="2581367"/>
+            <a:ext cx="7602746" cy="3966887"/>
+          </a:xfrm>
+          <a:prstGeom prst="rect">
+            <a:avLst/>
+          </a:prstGeom>
+        </p:spPr>
+      </p:pic>
+      <p:sp>
+        <p:nvSpPr>
+          <p:cNvPr id="2" name="TextBox 1">
             <a:extLst>
               <a:ext uri="{FF2B5EF4-FFF2-40B4-BE49-F238E27FC236}">
-                <a16:creationId xmlns:a16="http://schemas.microsoft.com/office/drawing/2014/main" id="{23A39E61-5753-452A-AC01-05F3AD76CFBB}"/>
+                <a16:creationId xmlns:a16="http://schemas.microsoft.com/office/drawing/2014/main" id="{90B62CB7-D5AC-4A79-A26E-6CD7BE7CFAC4}"/>
               </a:ext>
             </a:extLst>
           </p:cNvPr>
-          <p:cNvSpPr>
-            <a:spLocks noGrp="1"/>
-          </p:cNvSpPr>
-          <p:nvPr>
-            <p:ph idx="1"/>
-          </p:nvPr>
-        </p:nvSpPr>
-        <p:spPr>
-          <a:xfrm>
-            <a:off x="838200" y="2382093"/>
-            <a:ext cx="10515600" cy="3794869"/>
-          </a:xfrm>
-        </p:spPr>
-        <p:txBody>
-          <a:bodyPr vert="horz" lIns="91440" tIns="45720" rIns="91440" bIns="45720" rtlCol="0" anchor="t">
-            <a:normAutofit/>
+          <p:cNvSpPr txBox="1"/>
+          <p:nvPr/>
+        </p:nvSpPr>
+        <p:spPr>
+          <a:xfrm>
+            <a:off x="3142891" y="1633268"/>
+            <a:ext cx="6423803" cy="646331"/>
+          </a:xfrm>
+          <a:prstGeom prst="rect">
+            <a:avLst/>
+          </a:prstGeom>
+          <a:noFill/>
+        </p:spPr>
+        <p:txBody>
+          <a:bodyPr rot="0" spcFirstLastPara="0" vertOverflow="overflow" horzOverflow="overflow" vert="horz" wrap="square" lIns="91440" tIns="45720" rIns="91440" bIns="45720" numCol="1" spcCol="0" rtlCol="0" fromWordArt="0" anchor="t" anchorCtr="0" forceAA="0" compatLnSpc="1">
+            <a:prstTxWarp prst="textNoShape">
+              <a:avLst/>
+            </a:prstTxWarp>
+            <a:spAutoFit/>
           </a:bodyPr>
           <a:lstStyle/>
           <a:p>
             <a:r>
-              <a:rPr lang="en-US" dirty="0">
+              <a:rPr lang="en-US" sz="3600" b="1">
                 <a:cs typeface="Calibri"/>
               </a:rPr>
-              <a:t>IR Receiver is also called a photodiode.</a:t>
-            </a:r>
-          </a:p>
-          <a:p>
-            <a:r>
-              <a:rPr lang="en-US" dirty="0">
-                <a:cs typeface="Calibri"/>
-              </a:rPr>
-              <a:t>The emitter is an IR LED and the detector is an IR photodiode.</a:t>
-            </a:r>
-          </a:p>
-          <a:p>
-            <a:r>
-              <a:rPr lang="en-US" dirty="0">
-                <a:cs typeface="Calibri"/>
-              </a:rPr>
-              <a:t>The IR photodiode is sensitive to the IR light emitted by an IR LED. The photodiode's resistance and output voltage change in proportion to the IR light received.</a:t>
+              <a:t>The Working of an IR Receiver</a:t>
             </a:r>
           </a:p>
         </p:txBody>
@@ -4276,7 +4609,7 @@
     </p:spTree>
     <p:extLst>
       <p:ext uri="{BB962C8B-B14F-4D97-AF65-F5344CB8AC3E}">
-        <p14:creationId xmlns:p14="http://schemas.microsoft.com/office/powerpoint/2010/main" val="2462514724"/>
+        <p14:creationId xmlns:p14="http://schemas.microsoft.com/office/powerpoint/2010/main" val="2073972528"/>
       </p:ext>
     </p:extLst>
   </p:cSld>
@@ -4317,10 +4650,10 @@
       </p:grpSpPr>
       <p:pic>
         <p:nvPicPr>
-          <p:cNvPr id="4" name="Picture 4" descr="Diagram&#10;&#10;Description automatically generated">
+          <p:cNvPr id="4" name="Picture 4" descr="Diagram, schematic&#10;&#10;Description automatically generated">
             <a:extLst>
               <a:ext uri="{FF2B5EF4-FFF2-40B4-BE49-F238E27FC236}">
-                <a16:creationId xmlns:a16="http://schemas.microsoft.com/office/drawing/2014/main" id="{FAFA7A03-238C-43B7-82C5-E0070439BDFE}"/>
+                <a16:creationId xmlns:a16="http://schemas.microsoft.com/office/drawing/2014/main" id="{01BAA8F0-14EF-4177-8C62-A133FF1C7328}"/>
               </a:ext>
             </a:extLst>
           </p:cNvPr>
@@ -4337,18 +4670,59 @@
         </p:blipFill>
         <p:spPr>
           <a:xfrm>
-            <a:off x="2193985" y="1804990"/>
-            <a:ext cx="7602746" cy="3966887"/>
+            <a:off x="1489495" y="2390164"/>
+            <a:ext cx="9169877" cy="4291782"/>
           </a:xfrm>
           <a:prstGeom prst="rect">
             <a:avLst/>
           </a:prstGeom>
         </p:spPr>
       </p:pic>
+      <p:sp>
+        <p:nvSpPr>
+          <p:cNvPr id="5" name="TextBox 4">
+            <a:extLst>
+              <a:ext uri="{FF2B5EF4-FFF2-40B4-BE49-F238E27FC236}">
+                <a16:creationId xmlns:a16="http://schemas.microsoft.com/office/drawing/2014/main" id="{B1192873-DA70-4965-8FE1-C6338B0D9D79}"/>
+              </a:ext>
+            </a:extLst>
+          </p:cNvPr>
+          <p:cNvSpPr txBox="1"/>
+          <p:nvPr/>
+        </p:nvSpPr>
+        <p:spPr>
+          <a:xfrm>
+            <a:off x="4379344" y="1403230"/>
+            <a:ext cx="4180935" cy="769441"/>
+          </a:xfrm>
+          <a:prstGeom prst="rect">
+            <a:avLst/>
+          </a:prstGeom>
+          <a:noFill/>
+        </p:spPr>
+        <p:txBody>
+          <a:bodyPr rot="0" spcFirstLastPara="0" vertOverflow="overflow" horzOverflow="overflow" vert="horz" wrap="square" lIns="91440" tIns="45720" rIns="91440" bIns="45720" numCol="1" spcCol="0" rtlCol="0" fromWordArt="0" anchor="t" anchorCtr="0" forceAA="0" compatLnSpc="1">
+            <a:prstTxWarp prst="textNoShape">
+              <a:avLst/>
+            </a:prstTxWarp>
+            <a:spAutoFit/>
+          </a:bodyPr>
+          <a:lstStyle/>
+          <a:p>
+            <a:r>
+              <a:rPr lang="en-US" sz="4400" b="1"/>
+              <a:t>Schematic Circuit</a:t>
+            </a:r>
+            <a:endParaRPr lang="en-US" sz="4400" b="1">
+              <a:cs typeface="Calibri"/>
+            </a:endParaRPr>
+          </a:p>
+        </p:txBody>
+      </p:sp>
     </p:spTree>
     <p:extLst>
       <p:ext uri="{BB962C8B-B14F-4D97-AF65-F5344CB8AC3E}">
-        <p14:creationId xmlns:p14="http://schemas.microsoft.com/office/powerpoint/2010/main" val="2073972528"/>
+        <p14:creationId xmlns:p14="http://schemas.microsoft.com/office/powerpoint/2010/main" val="2701506794"/>
       </p:ext>
     </p:extLst>
   </p:cSld>
@@ -4389,10 +4763,10 @@
       </p:grpSpPr>
       <p:pic>
         <p:nvPicPr>
-          <p:cNvPr id="4" name="Picture 4" descr="Text, whiteboard&#10;&#10;Description automatically generated">
+          <p:cNvPr id="4" name="Picture 4" descr="A picture containing text, electronics&#10;&#10;Description automatically generated">
             <a:extLst>
               <a:ext uri="{FF2B5EF4-FFF2-40B4-BE49-F238E27FC236}">
-                <a16:creationId xmlns:a16="http://schemas.microsoft.com/office/drawing/2014/main" id="{7549BA95-D0DB-4279-9F7D-84A9988D736C}"/>
+                <a16:creationId xmlns:a16="http://schemas.microsoft.com/office/drawing/2014/main" id="{A6D782F0-83C1-482B-B6CF-E9CB706F5BB0}"/>
               </a:ext>
             </a:extLst>
           </p:cNvPr>
@@ -4409,18 +4783,218 @@
         </p:blipFill>
         <p:spPr>
           <a:xfrm>
-            <a:off x="1877683" y="1551317"/>
-            <a:ext cx="8666670" cy="4991818"/>
+            <a:off x="1949570" y="2298886"/>
+            <a:ext cx="8307236" cy="4431209"/>
           </a:xfrm>
           <a:prstGeom prst="rect">
             <a:avLst/>
           </a:prstGeom>
         </p:spPr>
       </p:pic>
+      <p:sp>
+        <p:nvSpPr>
+          <p:cNvPr id="5" name="TextBox 4">
+            <a:extLst>
+              <a:ext uri="{FF2B5EF4-FFF2-40B4-BE49-F238E27FC236}">
+                <a16:creationId xmlns:a16="http://schemas.microsoft.com/office/drawing/2014/main" id="{904BD857-20F7-45E6-AB6D-588DE3F3FD9B}"/>
+              </a:ext>
+            </a:extLst>
+          </p:cNvPr>
+          <p:cNvSpPr txBox="1"/>
+          <p:nvPr/>
+        </p:nvSpPr>
+        <p:spPr>
+          <a:xfrm>
+            <a:off x="3588589" y="1417608"/>
+            <a:ext cx="5287992" cy="769441"/>
+          </a:xfrm>
+          <a:prstGeom prst="rect">
+            <a:avLst/>
+          </a:prstGeom>
+          <a:noFill/>
+        </p:spPr>
+        <p:txBody>
+          <a:bodyPr rot="0" spcFirstLastPara="0" vertOverflow="overflow" horzOverflow="overflow" vert="horz" wrap="square" lIns="91440" tIns="45720" rIns="91440" bIns="45720" numCol="1" spcCol="0" rtlCol="0" fromWordArt="0" anchor="t" anchorCtr="0" forceAA="0" compatLnSpc="1">
+            <a:prstTxWarp prst="textNoShape">
+              <a:avLst/>
+            </a:prstTxWarp>
+            <a:spAutoFit/>
+          </a:bodyPr>
+          <a:lstStyle/>
+          <a:p>
+            <a:pPr algn="ctr"/>
+            <a:r>
+              <a:rPr lang="en-US" sz="4400" b="1"/>
+              <a:t>Breadboard Circuit</a:t>
+            </a:r>
+            <a:endParaRPr lang="en-US" sz="4400" b="1">
+              <a:cs typeface="Calibri"/>
+            </a:endParaRPr>
+          </a:p>
+        </p:txBody>
+      </p:sp>
     </p:spTree>
     <p:extLst>
       <p:ext uri="{BB962C8B-B14F-4D97-AF65-F5344CB8AC3E}">
-        <p14:creationId xmlns:p14="http://schemas.microsoft.com/office/powerpoint/2010/main" val="3404698375"/>
+        <p14:creationId xmlns:p14="http://schemas.microsoft.com/office/powerpoint/2010/main" val="3529089860"/>
+      </p:ext>
+    </p:extLst>
+  </p:cSld>
+  <p:clrMapOvr>
+    <a:masterClrMapping/>
+  </p:clrMapOvr>
+  <mc:AlternateContent xmlns:mc="http://schemas.openxmlformats.org/markup-compatibility/2006" xmlns:p14="http://schemas.microsoft.com/office/powerpoint/2010/main">
+    <mc:Choice Requires="p14">
+      <p:transition spd="med" p14:dur="700">
+        <p:fade/>
+      </p:transition>
+    </mc:Choice>
+    <mc:Fallback xmlns="">
+      <p:transition spd="med">
+        <p:fade/>
+      </p:transition>
+    </mc:Fallback>
+  </mc:AlternateContent>
+</p:sld>
+</file>
+
+<file path=ppt/slides/slide9.xml><?xml version="1.0" encoding="utf-8"?>
+<p:sld xmlns:a="http://schemas.openxmlformats.org/drawingml/2006/main" xmlns:r="http://schemas.openxmlformats.org/officeDocument/2006/relationships" xmlns:p="http://schemas.openxmlformats.org/presentationml/2006/main">
+  <p:cSld>
+    <p:spTree>
+      <p:nvGrpSpPr>
+        <p:cNvPr id="1" name=""/>
+        <p:cNvGrpSpPr/>
+        <p:nvPr/>
+      </p:nvGrpSpPr>
+      <p:grpSpPr>
+        <a:xfrm>
+          <a:off x="0" y="0"/>
+          <a:ext cx="0" cy="0"/>
+          <a:chOff x="0" y="0"/>
+          <a:chExt cx="0" cy="0"/>
+        </a:xfrm>
+      </p:grpSpPr>
+      <p:sp>
+        <p:nvSpPr>
+          <p:cNvPr id="2" name="Title 1">
+            <a:extLst>
+              <a:ext uri="{FF2B5EF4-FFF2-40B4-BE49-F238E27FC236}">
+                <a16:creationId xmlns:a16="http://schemas.microsoft.com/office/drawing/2014/main" id="{AD9A344E-2E6E-4F3A-8FAB-D9248803B1C6}"/>
+              </a:ext>
+            </a:extLst>
+          </p:cNvPr>
+          <p:cNvSpPr>
+            <a:spLocks noGrp="1"/>
+          </p:cNvSpPr>
+          <p:nvPr>
+            <p:ph type="title"/>
+          </p:nvPr>
+        </p:nvSpPr>
+        <p:spPr>
+          <a:xfrm>
+            <a:off x="838200" y="1401647"/>
+            <a:ext cx="10515600" cy="894243"/>
+          </a:xfrm>
+        </p:spPr>
+        <p:txBody>
+          <a:bodyPr/>
+          <a:lstStyle/>
+          <a:p>
+            <a:pPr algn="ctr"/>
+            <a:r>
+              <a:rPr lang="en-US" b="1">
+                <a:cs typeface="Calibri Light"/>
+              </a:rPr>
+              <a:t>Applications of the Project</a:t>
+            </a:r>
+          </a:p>
+        </p:txBody>
+      </p:sp>
+      <p:sp>
+        <p:nvSpPr>
+          <p:cNvPr id="3" name="Content Placeholder 2">
+            <a:extLst>
+              <a:ext uri="{FF2B5EF4-FFF2-40B4-BE49-F238E27FC236}">
+                <a16:creationId xmlns:a16="http://schemas.microsoft.com/office/drawing/2014/main" id="{CB379E28-D054-4256-B32D-02DB144B5804}"/>
+              </a:ext>
+            </a:extLst>
+          </p:cNvPr>
+          <p:cNvSpPr>
+            <a:spLocks noGrp="1"/>
+          </p:cNvSpPr>
+          <p:nvPr>
+            <p:ph idx="1"/>
+          </p:nvPr>
+        </p:nvSpPr>
+        <p:spPr>
+          <a:xfrm>
+            <a:off x="838200" y="2310206"/>
+            <a:ext cx="10515600" cy="3866756"/>
+          </a:xfrm>
+        </p:spPr>
+        <p:txBody>
+          <a:bodyPr vert="horz" lIns="91440" tIns="45720" rIns="91440" bIns="45720" rtlCol="0" anchor="t">
+            <a:normAutofit/>
+          </a:bodyPr>
+          <a:lstStyle/>
+          <a:p>
+            <a:r>
+              <a:rPr lang="en-US">
+                <a:cs typeface="Calibri"/>
+              </a:rPr>
+              <a:t>Smart homes and Offices</a:t>
+            </a:r>
+          </a:p>
+          <a:p>
+            <a:r>
+              <a:rPr lang="en-US">
+                <a:cs typeface="Calibri"/>
+              </a:rPr>
+              <a:t>Hospitals</a:t>
+            </a:r>
+          </a:p>
+          <a:p>
+            <a:r>
+              <a:rPr lang="en-US">
+                <a:cs typeface="Calibri"/>
+              </a:rPr>
+              <a:t>Underground Mining</a:t>
+            </a:r>
+          </a:p>
+          <a:p>
+            <a:r>
+              <a:rPr lang="en-US">
+                <a:cs typeface="Calibri"/>
+              </a:rPr>
+              <a:t>With Complex wiring</a:t>
+            </a:r>
+            <a:endParaRPr lang="en-US" dirty="0">
+              <a:cs typeface="Calibri"/>
+            </a:endParaRPr>
+          </a:p>
+          <a:p>
+            <a:r>
+              <a:rPr lang="en-US">
+                <a:cs typeface="Calibri"/>
+              </a:rPr>
+              <a:t>In Wooden homes</a:t>
+            </a:r>
+            <a:endParaRPr lang="en-US" dirty="0">
+              <a:cs typeface="Calibri"/>
+            </a:endParaRPr>
+          </a:p>
+          <a:p>
+            <a:endParaRPr lang="en-US" dirty="0">
+              <a:cs typeface="Calibri"/>
+            </a:endParaRPr>
+          </a:p>
+        </p:txBody>
+      </p:sp>
+    </p:spTree>
+    <p:extLst>
+      <p:ext uri="{BB962C8B-B14F-4D97-AF65-F5344CB8AC3E}">
+        <p14:creationId xmlns:p14="http://schemas.microsoft.com/office/powerpoint/2010/main" val="3141919736"/>
       </p:ext>
     </p:extLst>
   </p:cSld>

</xml_diff>